<commit_message>
Versão final da aula
Preparem se para o controle de versao!
</commit_message>
<xml_diff>
--- a/Material de Referencia/Controle de Versao.pptx
+++ b/Material de Referencia/Controle de Versao.pptx
@@ -6,7 +6,7 @@
     <p:sldMasterId id="2147483650" r:id="rId2"/>
   </p:sldMasterIdLst>
   <p:notesMasterIdLst>
-    <p:notesMasterId r:id="rId30"/>
+    <p:notesMasterId r:id="rId32"/>
   </p:notesMasterIdLst>
   <p:sldIdLst>
     <p:sldId id="256" r:id="rId3"/>
@@ -19,23 +19,25 @@
     <p:sldId id="296" r:id="rId10"/>
     <p:sldId id="274" r:id="rId11"/>
     <p:sldId id="285" r:id="rId12"/>
-    <p:sldId id="286" r:id="rId13"/>
-    <p:sldId id="287" r:id="rId14"/>
-    <p:sldId id="288" r:id="rId15"/>
-    <p:sldId id="289" r:id="rId16"/>
-    <p:sldId id="290" r:id="rId17"/>
-    <p:sldId id="257" r:id="rId18"/>
-    <p:sldId id="292" r:id="rId19"/>
-    <p:sldId id="262" r:id="rId20"/>
-    <p:sldId id="263" r:id="rId21"/>
-    <p:sldId id="264" r:id="rId22"/>
-    <p:sldId id="265" r:id="rId23"/>
-    <p:sldId id="267" r:id="rId24"/>
-    <p:sldId id="268" r:id="rId25"/>
-    <p:sldId id="293" r:id="rId26"/>
-    <p:sldId id="294" r:id="rId27"/>
-    <p:sldId id="297" r:id="rId28"/>
-    <p:sldId id="277" r:id="rId29"/>
+    <p:sldId id="298" r:id="rId13"/>
+    <p:sldId id="286" r:id="rId14"/>
+    <p:sldId id="287" r:id="rId15"/>
+    <p:sldId id="288" r:id="rId16"/>
+    <p:sldId id="289" r:id="rId17"/>
+    <p:sldId id="290" r:id="rId18"/>
+    <p:sldId id="257" r:id="rId19"/>
+    <p:sldId id="299" r:id="rId20"/>
+    <p:sldId id="292" r:id="rId21"/>
+    <p:sldId id="262" r:id="rId22"/>
+    <p:sldId id="263" r:id="rId23"/>
+    <p:sldId id="264" r:id="rId24"/>
+    <p:sldId id="265" r:id="rId25"/>
+    <p:sldId id="267" r:id="rId26"/>
+    <p:sldId id="268" r:id="rId27"/>
+    <p:sldId id="293" r:id="rId28"/>
+    <p:sldId id="294" r:id="rId29"/>
+    <p:sldId id="297" r:id="rId30"/>
+    <p:sldId id="277" r:id="rId31"/>
   </p:sldIdLst>
   <p:sldSz cx="9144000" cy="6858000" type="screen4x3"/>
   <p:notesSz cx="6858000" cy="9144000"/>
@@ -13772,6 +13774,347 @@
 </p:sldLayout>
 </file>
 
+<file path=ppt/slideLayouts/slideLayout11.xml><?xml version="1.0" encoding="utf-8"?>
+<p:sldLayout xmlns:a="http://schemas.openxmlformats.org/drawingml/2006/main" xmlns:r="http://schemas.openxmlformats.org/officeDocument/2006/relationships" xmlns:p="http://schemas.openxmlformats.org/presentationml/2006/main" type="title">
+  <p:cSld name="Slide de título">
+    <p:spTree>
+      <p:nvGrpSpPr>
+        <p:cNvPr id="1" name=""/>
+        <p:cNvGrpSpPr/>
+        <p:nvPr/>
+      </p:nvGrpSpPr>
+      <p:grpSpPr>
+        <a:xfrm>
+          <a:off x="0" y="0"/>
+          <a:ext cx="0" cy="0"/>
+          <a:chOff x="0" y="0"/>
+          <a:chExt cx="0" cy="0"/>
+        </a:xfrm>
+      </p:grpSpPr>
+      <p:sp>
+        <p:nvSpPr>
+          <p:cNvPr id="2" name="Título 1"/>
+          <p:cNvSpPr>
+            <a:spLocks noGrp="1"/>
+          </p:cNvSpPr>
+          <p:nvPr>
+            <p:ph type="ctrTitle"/>
+          </p:nvPr>
+        </p:nvSpPr>
+        <p:spPr>
+          <a:xfrm>
+            <a:off x="685800" y="2130425"/>
+            <a:ext cx="7772400" cy="1470025"/>
+          </a:xfrm>
+        </p:spPr>
+        <p:txBody>
+          <a:bodyPr/>
+          <a:lstStyle/>
+          <a:p>
+            <a:r>
+              <a:rPr lang="pt-BR" smtClean="0"/>
+              <a:t>Clique para editar o título mestre</a:t>
+            </a:r>
+            <a:endParaRPr lang="pt-BR"/>
+          </a:p>
+        </p:txBody>
+      </p:sp>
+      <p:sp>
+        <p:nvSpPr>
+          <p:cNvPr id="3" name="Subtítulo 2"/>
+          <p:cNvSpPr>
+            <a:spLocks noGrp="1"/>
+          </p:cNvSpPr>
+          <p:nvPr>
+            <p:ph type="subTitle" idx="1"/>
+          </p:nvPr>
+        </p:nvSpPr>
+        <p:spPr>
+          <a:xfrm>
+            <a:off x="1371600" y="3886200"/>
+            <a:ext cx="6400800" cy="1752600"/>
+          </a:xfrm>
+        </p:spPr>
+        <p:txBody>
+          <a:bodyPr/>
+          <a:lstStyle>
+            <a:lvl1pPr marL="0" indent="0" algn="ctr">
+              <a:buNone/>
+              <a:defRPr>
+                <a:solidFill>
+                  <a:schemeClr val="tx1">
+                    <a:tint val="75000"/>
+                  </a:schemeClr>
+                </a:solidFill>
+              </a:defRPr>
+            </a:lvl1pPr>
+            <a:lvl2pPr marL="457200" indent="0" algn="ctr">
+              <a:buNone/>
+              <a:defRPr>
+                <a:solidFill>
+                  <a:schemeClr val="tx1">
+                    <a:tint val="75000"/>
+                  </a:schemeClr>
+                </a:solidFill>
+              </a:defRPr>
+            </a:lvl2pPr>
+            <a:lvl3pPr marL="914400" indent="0" algn="ctr">
+              <a:buNone/>
+              <a:defRPr>
+                <a:solidFill>
+                  <a:schemeClr val="tx1">
+                    <a:tint val="75000"/>
+                  </a:schemeClr>
+                </a:solidFill>
+              </a:defRPr>
+            </a:lvl3pPr>
+            <a:lvl4pPr marL="1371600" indent="0" algn="ctr">
+              <a:buNone/>
+              <a:defRPr>
+                <a:solidFill>
+                  <a:schemeClr val="tx1">
+                    <a:tint val="75000"/>
+                  </a:schemeClr>
+                </a:solidFill>
+              </a:defRPr>
+            </a:lvl4pPr>
+            <a:lvl5pPr marL="1828800" indent="0" algn="ctr">
+              <a:buNone/>
+              <a:defRPr>
+                <a:solidFill>
+                  <a:schemeClr val="tx1">
+                    <a:tint val="75000"/>
+                  </a:schemeClr>
+                </a:solidFill>
+              </a:defRPr>
+            </a:lvl5pPr>
+            <a:lvl6pPr marL="2286000" indent="0" algn="ctr">
+              <a:buNone/>
+              <a:defRPr>
+                <a:solidFill>
+                  <a:schemeClr val="tx1">
+                    <a:tint val="75000"/>
+                  </a:schemeClr>
+                </a:solidFill>
+              </a:defRPr>
+            </a:lvl6pPr>
+            <a:lvl7pPr marL="2743200" indent="0" algn="ctr">
+              <a:buNone/>
+              <a:defRPr>
+                <a:solidFill>
+                  <a:schemeClr val="tx1">
+                    <a:tint val="75000"/>
+                  </a:schemeClr>
+                </a:solidFill>
+              </a:defRPr>
+            </a:lvl7pPr>
+            <a:lvl8pPr marL="3200400" indent="0" algn="ctr">
+              <a:buNone/>
+              <a:defRPr>
+                <a:solidFill>
+                  <a:schemeClr val="tx1">
+                    <a:tint val="75000"/>
+                  </a:schemeClr>
+                </a:solidFill>
+              </a:defRPr>
+            </a:lvl8pPr>
+            <a:lvl9pPr marL="3657600" indent="0" algn="ctr">
+              <a:buNone/>
+              <a:defRPr>
+                <a:solidFill>
+                  <a:schemeClr val="tx1">
+                    <a:tint val="75000"/>
+                  </a:schemeClr>
+                </a:solidFill>
+              </a:defRPr>
+            </a:lvl9pPr>
+          </a:lstStyle>
+          <a:p>
+            <a:r>
+              <a:rPr lang="pt-BR" smtClean="0"/>
+              <a:t>Clique para editar o estilo do subtítulo mestre</a:t>
+            </a:r>
+            <a:endParaRPr lang="pt-BR"/>
+          </a:p>
+        </p:txBody>
+      </p:sp>
+      <p:sp>
+        <p:nvSpPr>
+          <p:cNvPr id="10" name="Espaço Reservado para Data 9"/>
+          <p:cNvSpPr>
+            <a:spLocks noGrp="1"/>
+          </p:cNvSpPr>
+          <p:nvPr>
+            <p:ph type="dt" sz="half" idx="10"/>
+          </p:nvPr>
+        </p:nvSpPr>
+        <p:spPr>
+          <a:xfrm>
+            <a:off x="467544" y="6381328"/>
+            <a:ext cx="2133600" cy="365125"/>
+          </a:xfrm>
+          <a:prstGeom prst="rect">
+            <a:avLst/>
+          </a:prstGeom>
+        </p:spPr>
+        <p:txBody>
+          <a:bodyPr/>
+          <a:lstStyle/>
+          <a:p>
+            <a:fld id="{938225DB-41C4-4837-AC28-8C05A5B302BA}" type="datetimeFigureOut">
+              <a:rPr lang="pt-BR" smtClean="0"/>
+              <a:pPr/>
+              <a:t>03/05/2016</a:t>
+            </a:fld>
+            <a:endParaRPr lang="pt-BR" dirty="0"/>
+          </a:p>
+        </p:txBody>
+      </p:sp>
+      <p:sp>
+        <p:nvSpPr>
+          <p:cNvPr id="12" name="Espaço Reservado para Rodapé 11"/>
+          <p:cNvSpPr>
+            <a:spLocks noGrp="1"/>
+          </p:cNvSpPr>
+          <p:nvPr>
+            <p:ph type="ftr" sz="quarter" idx="12"/>
+          </p:nvPr>
+        </p:nvSpPr>
+        <p:spPr>
+          <a:xfrm>
+            <a:off x="3131840" y="6381328"/>
+            <a:ext cx="2895600" cy="365125"/>
+          </a:xfrm>
+          <a:prstGeom prst="rect">
+            <a:avLst/>
+          </a:prstGeom>
+        </p:spPr>
+        <p:txBody>
+          <a:bodyPr/>
+          <a:lstStyle/>
+          <a:p>
+            <a:endParaRPr lang="pt-BR" dirty="0"/>
+          </a:p>
+        </p:txBody>
+      </p:sp>
+      <p:sp>
+        <p:nvSpPr>
+          <p:cNvPr id="11" name="Espaço Reservado para Número de Slide 10"/>
+          <p:cNvSpPr>
+            <a:spLocks noGrp="1"/>
+          </p:cNvSpPr>
+          <p:nvPr>
+            <p:ph type="sldNum" sz="quarter" idx="11"/>
+          </p:nvPr>
+        </p:nvSpPr>
+        <p:spPr>
+          <a:xfrm>
+            <a:off x="6516216" y="6381328"/>
+            <a:ext cx="2133600" cy="365125"/>
+          </a:xfrm>
+          <a:prstGeom prst="rect">
+            <a:avLst/>
+          </a:prstGeom>
+        </p:spPr>
+        <p:txBody>
+          <a:bodyPr/>
+          <a:lstStyle>
+            <a:lvl1pPr>
+              <a:defRPr b="1">
+                <a:solidFill>
+                  <a:schemeClr val="bg1">
+                    <a:lumMod val="50000"/>
+                  </a:schemeClr>
+                </a:solidFill>
+              </a:defRPr>
+            </a:lvl1pPr>
+          </a:lstStyle>
+          <a:p>
+            <a:fld id="{0C7249BC-98ED-478A-85C7-0D7230323FE2}" type="slidenum">
+              <a:rPr lang="pt-BR" smtClean="0"/>
+              <a:pPr/>
+              <a:t>‹nº›</a:t>
+            </a:fld>
+            <a:endParaRPr lang="pt-BR" dirty="0"/>
+          </a:p>
+        </p:txBody>
+      </p:sp>
+      <p:sp>
+        <p:nvSpPr>
+          <p:cNvPr id="7" name="Retângulo 6"/>
+          <p:cNvSpPr/>
+          <p:nvPr userDrawn="1"/>
+        </p:nvSpPr>
+        <p:spPr>
+          <a:xfrm>
+            <a:off x="0" y="6381328"/>
+            <a:ext cx="9144000" cy="504056"/>
+          </a:xfrm>
+          <a:prstGeom prst="rect">
+            <a:avLst/>
+          </a:prstGeom>
+          <a:gradFill flip="none" rotWithShape="1">
+            <a:gsLst>
+              <a:gs pos="0">
+                <a:schemeClr val="accent2">
+                  <a:lumMod val="75000"/>
+                </a:schemeClr>
+              </a:gs>
+              <a:gs pos="50000">
+                <a:schemeClr val="accent2">
+                  <a:lumMod val="60000"/>
+                  <a:lumOff val="40000"/>
+                </a:schemeClr>
+              </a:gs>
+              <a:gs pos="100000">
+                <a:schemeClr val="bg1"/>
+              </a:gs>
+            </a:gsLst>
+            <a:lin ang="10800000" scaled="1"/>
+            <a:tileRect/>
+          </a:gradFill>
+          <a:ln>
+            <a:noFill/>
+          </a:ln>
+        </p:spPr>
+        <p:style>
+          <a:lnRef idx="2">
+            <a:schemeClr val="accent1">
+              <a:shade val="50000"/>
+            </a:schemeClr>
+          </a:lnRef>
+          <a:fillRef idx="1">
+            <a:schemeClr val="accent1"/>
+          </a:fillRef>
+          <a:effectRef idx="0">
+            <a:schemeClr val="accent1"/>
+          </a:effectRef>
+          <a:fontRef idx="minor">
+            <a:schemeClr val="lt1"/>
+          </a:fontRef>
+        </p:style>
+        <p:txBody>
+          <a:bodyPr rtlCol="0" anchor="ctr"/>
+          <a:lstStyle/>
+          <a:p>
+            <a:pPr algn="ctr"/>
+            <a:endParaRPr lang="pt-BR"/>
+          </a:p>
+        </p:txBody>
+      </p:sp>
+    </p:spTree>
+    <p:extLst>
+      <p:ext uri="{BB962C8B-B14F-4D97-AF65-F5344CB8AC3E}">
+        <p14:creationId xmlns:p14="http://schemas.microsoft.com/office/powerpoint/2010/main" val="1601133621"/>
+      </p:ext>
+    </p:extLst>
+  </p:cSld>
+  <p:clrMapOvr>
+    <a:masterClrMapping/>
+  </p:clrMapOvr>
+</p:sldLayout>
+</file>
+
 <file path=ppt/slideLayouts/slideLayout2.xml><?xml version="1.0" encoding="utf-8"?>
 <p:sldLayout xmlns:a="http://schemas.openxmlformats.org/drawingml/2006/main" xmlns:r="http://schemas.openxmlformats.org/officeDocument/2006/relationships" xmlns:p="http://schemas.openxmlformats.org/presentationml/2006/main" type="obj" preserve="1">
   <p:cSld name="Título e conteúdo">
@@ -16619,7 +16962,7 @@
           <p:nvPr userDrawn="1"/>
         </p:nvPicPr>
         <p:blipFill>
-          <a:blip r:embed="rId11" cstate="print"/>
+          <a:blip r:embed="rId12" cstate="print"/>
           <a:stretch>
             <a:fillRect/>
           </a:stretch>
@@ -16641,7 +16984,7 @@
           <p:nvPr userDrawn="1"/>
         </p:nvPicPr>
         <p:blipFill>
-          <a:blip r:embed="rId12" cstate="print"/>
+          <a:blip r:embed="rId13" cstate="print"/>
           <a:srcRect/>
           <a:stretch>
             <a:fillRect/>
@@ -16665,7 +17008,7 @@
           <p:nvPr userDrawn="1"/>
         </p:nvPicPr>
         <p:blipFill>
-          <a:blip r:embed="rId13" cstate="print"/>
+          <a:blip r:embed="rId14" cstate="print"/>
           <a:stretch>
             <a:fillRect/>
           </a:stretch>
@@ -16693,6 +17036,7 @@
     <p:sldLayoutId id="2147483670" r:id="rId7"/>
     <p:sldLayoutId id="2147483671" r:id="rId8"/>
     <p:sldLayoutId id="2147483672" r:id="rId9"/>
+    <p:sldLayoutId id="2147483675" r:id="rId10"/>
   </p:sldLayoutIdLst>
   <p:txStyles>
     <p:titleStyle>
@@ -17399,6 +17743,175 @@
           <a:chExt cx="0" cy="0"/>
         </a:xfrm>
       </p:grpSpPr>
+      <p:pic>
+        <p:nvPicPr>
+          <p:cNvPr id="4" name="Imagem 3"/>
+          <p:cNvPicPr>
+            <a:picLocks noChangeAspect="1"/>
+          </p:cNvPicPr>
+          <p:nvPr/>
+        </p:nvPicPr>
+        <p:blipFill>
+          <a:blip r:embed="rId2">
+            <a:extLst>
+              <a:ext uri="{28A0092B-C50C-407E-A947-70E740481C1C}">
+                <a14:useLocalDpi xmlns:a14="http://schemas.microsoft.com/office/drawing/2010/main" val="0"/>
+              </a:ext>
+            </a:extLst>
+          </a:blip>
+          <a:stretch>
+            <a:fillRect/>
+          </a:stretch>
+        </p:blipFill>
+        <p:spPr>
+          <a:xfrm>
+            <a:off x="-27484" y="2227249"/>
+            <a:ext cx="9144000" cy="2228503"/>
+          </a:xfrm>
+          <a:prstGeom prst="rect">
+            <a:avLst/>
+          </a:prstGeom>
+        </p:spPr>
+      </p:pic>
+      <p:sp>
+        <p:nvSpPr>
+          <p:cNvPr id="2" name="Título 1"/>
+          <p:cNvSpPr>
+            <a:spLocks noGrp="1"/>
+          </p:cNvSpPr>
+          <p:nvPr>
+            <p:ph type="title"/>
+          </p:nvPr>
+        </p:nvSpPr>
+        <p:spPr/>
+        <p:txBody>
+          <a:bodyPr/>
+          <a:lstStyle/>
+          <a:p>
+            <a:r>
+              <a:rPr lang="pt-BR" b="1" dirty="0" smtClean="0"/>
+              <a:t>Controle de Versão</a:t>
+            </a:r>
+            <a:endParaRPr lang="pt-BR" b="1" dirty="0">
+              <a:effectLst>
+                <a:outerShdw blurRad="38100" dist="38100" dir="2700000" algn="tl">
+                  <a:srgbClr val="000000">
+                    <a:alpha val="43137"/>
+                  </a:srgbClr>
+                </a:outerShdw>
+              </a:effectLst>
+            </a:endParaRPr>
+          </a:p>
+        </p:txBody>
+      </p:sp>
+      <p:sp>
+        <p:nvSpPr>
+          <p:cNvPr id="3" name="Espaço Reservado para Conteúdo 2"/>
+          <p:cNvSpPr>
+            <a:spLocks noGrp="1"/>
+          </p:cNvSpPr>
+          <p:nvPr>
+            <p:ph idx="1"/>
+          </p:nvPr>
+        </p:nvSpPr>
+        <p:spPr/>
+        <p:txBody>
+          <a:bodyPr/>
+          <a:lstStyle/>
+          <a:p>
+            <a:r>
+              <a:rPr lang="pt-BR" sz="2800" b="1" dirty="0" smtClean="0"/>
+              <a:t>Remover/Excluir Arquivos</a:t>
+            </a:r>
+            <a:endParaRPr lang="pt-BR" sz="2800" b="1" dirty="0"/>
+          </a:p>
+        </p:txBody>
+      </p:sp>
+      <p:sp>
+        <p:nvSpPr>
+          <p:cNvPr id="15" name="Retângulo 14"/>
+          <p:cNvSpPr/>
+          <p:nvPr/>
+        </p:nvSpPr>
+        <p:spPr>
+          <a:xfrm>
+            <a:off x="5436096" y="2981460"/>
+            <a:ext cx="1728192" cy="360040"/>
+          </a:xfrm>
+          <a:prstGeom prst="rect">
+            <a:avLst/>
+          </a:prstGeom>
+          <a:noFill/>
+          <a:ln>
+            <a:solidFill>
+              <a:srgbClr val="FF0000"/>
+            </a:solidFill>
+          </a:ln>
+        </p:spPr>
+        <p:style>
+          <a:lnRef idx="2">
+            <a:schemeClr val="accent1">
+              <a:shade val="50000"/>
+            </a:schemeClr>
+          </a:lnRef>
+          <a:fillRef idx="1">
+            <a:schemeClr val="accent1"/>
+          </a:fillRef>
+          <a:effectRef idx="0">
+            <a:schemeClr val="accent1"/>
+          </a:effectRef>
+          <a:fontRef idx="minor">
+            <a:schemeClr val="lt1"/>
+          </a:fontRef>
+        </p:style>
+        <p:txBody>
+          <a:bodyPr rtlCol="0" anchor="ctr"/>
+          <a:lstStyle/>
+          <a:p>
+            <a:pPr algn="ctr"/>
+            <a:endParaRPr lang="pt-BR">
+              <a:noFill/>
+            </a:endParaRPr>
+          </a:p>
+        </p:txBody>
+      </p:sp>
+    </p:spTree>
+    <p:extLst>
+      <p:ext uri="{BB962C8B-B14F-4D97-AF65-F5344CB8AC3E}">
+        <p14:creationId xmlns:p14="http://schemas.microsoft.com/office/powerpoint/2010/main" val="904653945"/>
+      </p:ext>
+    </p:extLst>
+  </p:cSld>
+  <p:clrMapOvr>
+    <a:masterClrMapping/>
+  </p:clrMapOvr>
+  <p:timing>
+    <p:tnLst>
+      <p:par>
+        <p:cTn id="1" dur="indefinite" restart="never" nodeType="tmRoot"/>
+      </p:par>
+    </p:tnLst>
+  </p:timing>
+</p:sld>
+</file>
+
+<file path=ppt/slides/slide12.xml><?xml version="1.0" encoding="utf-8"?>
+<p:sld xmlns:a="http://schemas.openxmlformats.org/drawingml/2006/main" xmlns:r="http://schemas.openxmlformats.org/officeDocument/2006/relationships" xmlns:p="http://schemas.openxmlformats.org/presentationml/2006/main">
+  <p:cSld>
+    <p:spTree>
+      <p:nvGrpSpPr>
+        <p:cNvPr id="1" name=""/>
+        <p:cNvGrpSpPr/>
+        <p:nvPr/>
+      </p:nvGrpSpPr>
+      <p:grpSpPr>
+        <a:xfrm>
+          <a:off x="0" y="0"/>
+          <a:ext cx="0" cy="0"/>
+          <a:chOff x="0" y="0"/>
+          <a:chExt cx="0" cy="0"/>
+        </a:xfrm>
+      </p:grpSpPr>
       <p:sp>
         <p:nvSpPr>
           <p:cNvPr id="2" name="Título 1"/>
@@ -17597,7 +18110,7 @@
 </p:sld>
 </file>
 
-<file path=ppt/slides/slide12.xml><?xml version="1.0" encoding="utf-8"?>
+<file path=ppt/slides/slide13.xml><?xml version="1.0" encoding="utf-8"?>
 <p:sld xmlns:a="http://schemas.openxmlformats.org/drawingml/2006/main" xmlns:r="http://schemas.openxmlformats.org/officeDocument/2006/relationships" xmlns:p="http://schemas.openxmlformats.org/presentationml/2006/main">
   <p:cSld>
     <p:spTree>
@@ -17723,209 +18236,6 @@
 </p:sld>
 </file>
 
-<file path=ppt/slides/slide13.xml><?xml version="1.0" encoding="utf-8"?>
-<p:sld xmlns:a="http://schemas.openxmlformats.org/drawingml/2006/main" xmlns:r="http://schemas.openxmlformats.org/officeDocument/2006/relationships" xmlns:p="http://schemas.openxmlformats.org/presentationml/2006/main">
-  <p:cSld>
-    <p:spTree>
-      <p:nvGrpSpPr>
-        <p:cNvPr id="1" name=""/>
-        <p:cNvGrpSpPr/>
-        <p:nvPr/>
-      </p:nvGrpSpPr>
-      <p:grpSpPr>
-        <a:xfrm>
-          <a:off x="0" y="0"/>
-          <a:ext cx="0" cy="0"/>
-          <a:chOff x="0" y="0"/>
-          <a:chExt cx="0" cy="0"/>
-        </a:xfrm>
-      </p:grpSpPr>
-      <p:sp>
-        <p:nvSpPr>
-          <p:cNvPr id="2" name="Título 1"/>
-          <p:cNvSpPr>
-            <a:spLocks noGrp="1"/>
-          </p:cNvSpPr>
-          <p:nvPr>
-            <p:ph type="title"/>
-          </p:nvPr>
-        </p:nvSpPr>
-        <p:spPr/>
-        <p:txBody>
-          <a:bodyPr/>
-          <a:lstStyle/>
-          <a:p>
-            <a:r>
-              <a:rPr lang="pt-BR" b="1" dirty="0" smtClean="0"/>
-              <a:t>Controle de Versão</a:t>
-            </a:r>
-            <a:endParaRPr lang="pt-BR" b="1" dirty="0">
-              <a:effectLst>
-                <a:outerShdw blurRad="38100" dist="38100" dir="2700000" algn="tl">
-                  <a:srgbClr val="000000">
-                    <a:alpha val="43137"/>
-                  </a:srgbClr>
-                </a:outerShdw>
-              </a:effectLst>
-            </a:endParaRPr>
-          </a:p>
-        </p:txBody>
-      </p:sp>
-      <p:sp>
-        <p:nvSpPr>
-          <p:cNvPr id="12" name="Espaço Reservado para Conteúdo 11"/>
-          <p:cNvSpPr>
-            <a:spLocks noGrp="1"/>
-          </p:cNvSpPr>
-          <p:nvPr>
-            <p:ph idx="1"/>
-          </p:nvPr>
-        </p:nvSpPr>
-        <p:spPr>
-          <a:xfrm>
-            <a:off x="457200" y="1484784"/>
-            <a:ext cx="8229600" cy="3844925"/>
-          </a:xfrm>
-        </p:spPr>
-        <p:txBody>
-          <a:bodyPr/>
-          <a:lstStyle/>
-          <a:p>
-            <a:r>
-              <a:rPr lang="pt-BR" sz="2400" b="1" dirty="0" smtClean="0"/>
-              <a:t>Cenários comuns de trabalho em equipe</a:t>
-            </a:r>
-          </a:p>
-          <a:p>
-            <a:pPr marL="914400" lvl="1" indent="-457200">
-              <a:buFont typeface="+mj-lt"/>
-              <a:buAutoNum type="arabicPeriod"/>
-            </a:pPr>
-            <a:r>
-              <a:rPr lang="pt-BR" sz="2000" dirty="0" smtClean="0"/>
-              <a:t>Dois usuários realizam </a:t>
-            </a:r>
-            <a:r>
-              <a:rPr lang="pt-BR" sz="2000" i="1" dirty="0" err="1" smtClean="0"/>
-              <a:t>check-in</a:t>
-            </a:r>
-            <a:r>
-              <a:rPr lang="pt-BR" sz="2000" dirty="0" smtClean="0"/>
-              <a:t> em dois arquivos distintos para a mesma finalidade</a:t>
-            </a:r>
-          </a:p>
-          <a:p>
-            <a:pPr marL="1257300" lvl="2" indent="-342900"/>
-            <a:r>
-              <a:rPr lang="pt-BR" sz="1600" dirty="0" smtClean="0"/>
-              <a:t>Um deles deveria ser apagado</a:t>
-            </a:r>
-          </a:p>
-          <a:p>
-            <a:pPr marL="1257300" lvl="2" indent="-342900"/>
-            <a:r>
-              <a:rPr lang="pt-BR" sz="1600" dirty="0" smtClean="0"/>
-              <a:t>Realizar a comparação </a:t>
-            </a:r>
-          </a:p>
-          <a:p>
-            <a:pPr marL="1257300" lvl="2" indent="-342900"/>
-            <a:r>
-              <a:rPr lang="pt-BR" sz="1600" dirty="0" smtClean="0"/>
-              <a:t>Realizar as alterações</a:t>
-            </a:r>
-          </a:p>
-          <a:p>
-            <a:pPr marL="1257300" lvl="2" indent="-342900"/>
-            <a:r>
-              <a:rPr lang="pt-BR" sz="1600" dirty="0" smtClean="0"/>
-              <a:t>Atualizar o documento a ser mantido com as alterações (</a:t>
-            </a:r>
-            <a:r>
-              <a:rPr lang="pt-BR" sz="1600" i="1" dirty="0" err="1" smtClean="0"/>
-              <a:t>check-in</a:t>
-            </a:r>
-            <a:r>
-              <a:rPr lang="pt-BR" sz="1600" dirty="0" smtClean="0"/>
-              <a:t>)</a:t>
-            </a:r>
-          </a:p>
-          <a:p>
-            <a:pPr marL="1257300" lvl="2" indent="-342900"/>
-            <a:r>
-              <a:rPr lang="pt-BR" sz="1600" dirty="0" smtClean="0"/>
-              <a:t>Apagar o documento a ser descartado (</a:t>
-            </a:r>
-            <a:r>
-              <a:rPr lang="pt-BR" sz="1600" i="1" dirty="0" smtClean="0"/>
-              <a:t>delete</a:t>
-            </a:r>
-            <a:r>
-              <a:rPr lang="pt-BR" sz="1600" dirty="0" smtClean="0"/>
-              <a:t>)</a:t>
-            </a:r>
-          </a:p>
-          <a:p>
-            <a:pPr marL="971550" lvl="1" indent="-457200">
-              <a:buFont typeface="+mj-lt"/>
-              <a:buAutoNum type="arabicPeriod"/>
-            </a:pPr>
-            <a:r>
-              <a:rPr lang="pt-BR" sz="2000" dirty="0" smtClean="0"/>
-              <a:t>Um usuário submete uma versão equivocada ao repositório e sobrescreve a versão correta</a:t>
-            </a:r>
-          </a:p>
-          <a:p>
-            <a:pPr marL="1371600" lvl="2" indent="-457200"/>
-            <a:r>
-              <a:rPr lang="pt-BR" sz="1600" i="1" dirty="0" err="1" smtClean="0"/>
-              <a:t>Revert</a:t>
-            </a:r>
-            <a:endParaRPr lang="pt-BR" sz="1600" i="1" dirty="0" smtClean="0"/>
-          </a:p>
-          <a:p>
-            <a:pPr marL="971550" lvl="1" indent="-457200">
-              <a:buFont typeface="+mj-lt"/>
-              <a:buAutoNum type="arabicPeriod"/>
-            </a:pPr>
-            <a:r>
-              <a:rPr lang="pt-BR" sz="2000" dirty="0" smtClean="0"/>
-              <a:t>Mesma situação da 2, mas após várias sobreposições</a:t>
-            </a:r>
-          </a:p>
-          <a:p>
-            <a:pPr marL="1371600" lvl="2" indent="-457200"/>
-            <a:r>
-              <a:rPr lang="pt-BR" sz="1600" i="1" dirty="0" err="1" smtClean="0"/>
-              <a:t>Revert</a:t>
-            </a:r>
-            <a:r>
-              <a:rPr lang="pt-BR" sz="1600" i="1" dirty="0" smtClean="0"/>
-              <a:t> to </a:t>
-            </a:r>
-            <a:r>
-              <a:rPr lang="pt-BR" sz="1600" i="1" dirty="0" err="1" smtClean="0"/>
-              <a:t>revision</a:t>
-            </a:r>
-            <a:endParaRPr lang="pt-BR" sz="1600" i="1" dirty="0" smtClean="0"/>
-          </a:p>
-        </p:txBody>
-      </p:sp>
-    </p:spTree>
-  </p:cSld>
-  <p:clrMapOvr>
-    <a:masterClrMapping/>
-  </p:clrMapOvr>
-  <p:timing>
-    <p:tnLst>
-      <p:par>
-        <p:cTn id="1" dur="indefinite" restart="never" nodeType="tmRoot"/>
-      </p:par>
-    </p:tnLst>
-  </p:timing>
-</p:sld>
-</file>
-
 <file path=ppt/slides/slide14.xml><?xml version="1.0" encoding="utf-8"?>
 <p:sld xmlns:a="http://schemas.openxmlformats.org/drawingml/2006/main" xmlns:r="http://schemas.openxmlformats.org/officeDocument/2006/relationships" xmlns:p="http://schemas.openxmlformats.org/presentationml/2006/main">
   <p:cSld>
@@ -18002,18 +18312,26 @@
           <a:p>
             <a:pPr marL="914400" lvl="1" indent="-457200">
               <a:buFont typeface="+mj-lt"/>
-              <a:buAutoNum type="arabicPeriod" startAt="4"/>
+              <a:buAutoNum type="arabicPeriod"/>
             </a:pPr>
             <a:r>
               <a:rPr lang="pt-BR" sz="2000" dirty="0" smtClean="0"/>
-              <a:t>Dois usuários realizam alterações distintas no mesmo documento</a:t>
+              <a:t>Dois usuários realizam </a:t>
+            </a:r>
+            <a:r>
+              <a:rPr lang="pt-BR" sz="2000" i="1" dirty="0" err="1" smtClean="0"/>
+              <a:t>check-in</a:t>
+            </a:r>
+            <a:r>
+              <a:rPr lang="pt-BR" sz="2000" dirty="0" smtClean="0"/>
+              <a:t> em dois arquivos distintos para a mesma finalidade</a:t>
             </a:r>
           </a:p>
           <a:p>
             <a:pPr marL="1257300" lvl="2" indent="-342900"/>
             <a:r>
               <a:rPr lang="pt-BR" sz="1600" dirty="0" smtClean="0"/>
-              <a:t>Atualizar o repositório</a:t>
+              <a:t>Um deles deveria ser apagado</a:t>
             </a:r>
           </a:p>
           <a:p>
@@ -18027,21 +18345,14 @@
             <a:pPr marL="1257300" lvl="2" indent="-342900"/>
             <a:r>
               <a:rPr lang="pt-BR" sz="1600" dirty="0" smtClean="0"/>
-              <a:t>Comunicar o conflito para o outro usuário</a:t>
+              <a:t>Realizar as alterações</a:t>
             </a:r>
           </a:p>
           <a:p>
             <a:pPr marL="1257300" lvl="2" indent="-342900"/>
             <a:r>
               <a:rPr lang="pt-BR" sz="1600" dirty="0" smtClean="0"/>
-              <a:t>Realizar as alterações para acomodar as mudanças de ambos usuários</a:t>
-            </a:r>
-          </a:p>
-          <a:p>
-            <a:pPr marL="1257300" lvl="2" indent="-342900"/>
-            <a:r>
-              <a:rPr lang="pt-BR" sz="1600" dirty="0" smtClean="0"/>
-              <a:t>Atualizar o documento com ambas as alterações (</a:t>
+              <a:t>Atualizar o documento a ser mantido com as alterações (</a:t>
             </a:r>
             <a:r>
               <a:rPr lang="pt-BR" sz="1600" i="1" dirty="0" err="1" smtClean="0"/>
@@ -18051,6 +18362,69 @@
               <a:rPr lang="pt-BR" sz="1600" dirty="0" smtClean="0"/>
               <a:t>)</a:t>
             </a:r>
+          </a:p>
+          <a:p>
+            <a:pPr marL="1257300" lvl="2" indent="-342900"/>
+            <a:r>
+              <a:rPr lang="pt-BR" sz="1600" dirty="0" smtClean="0"/>
+              <a:t>Apagar o documento a ser descartado (</a:t>
+            </a:r>
+            <a:r>
+              <a:rPr lang="pt-BR" sz="1600" i="1" dirty="0" smtClean="0"/>
+              <a:t>delete</a:t>
+            </a:r>
+            <a:r>
+              <a:rPr lang="pt-BR" sz="1600" dirty="0" smtClean="0"/>
+              <a:t>)</a:t>
+            </a:r>
+          </a:p>
+          <a:p>
+            <a:pPr marL="971550" lvl="1" indent="-457200">
+              <a:buFont typeface="+mj-lt"/>
+              <a:buAutoNum type="arabicPeriod"/>
+            </a:pPr>
+            <a:r>
+              <a:rPr lang="pt-BR" sz="2000" dirty="0" smtClean="0"/>
+              <a:t>Um usuário submete uma versão equivocada ao repositório e sobrescreve a versão correta</a:t>
+            </a:r>
+          </a:p>
+          <a:p>
+            <a:pPr marL="1371600" lvl="2" indent="-457200"/>
+            <a:r>
+              <a:rPr lang="pt-BR" sz="1600" i="1" dirty="0" err="1" smtClean="0"/>
+              <a:t>Revert</a:t>
+            </a:r>
+            <a:endParaRPr lang="pt-BR" sz="1600" i="1" dirty="0" smtClean="0"/>
+          </a:p>
+          <a:p>
+            <a:pPr marL="971550" lvl="1" indent="-457200">
+              <a:buFont typeface="+mj-lt"/>
+              <a:buAutoNum type="arabicPeriod"/>
+            </a:pPr>
+            <a:r>
+              <a:rPr lang="pt-BR" sz="2000" dirty="0" smtClean="0"/>
+              <a:t>Mesma situação da 2, mas após várias sobreposições</a:t>
+            </a:r>
+          </a:p>
+          <a:p>
+            <a:pPr marL="1371600" lvl="2" indent="-457200"/>
+            <a:r>
+              <a:rPr lang="pt-BR" sz="1600" i="1" dirty="0" err="1" smtClean="0"/>
+              <a:t>Revert</a:t>
+            </a:r>
+            <a:r>
+              <a:rPr lang="pt-BR" sz="1600" i="1" dirty="0" smtClean="0"/>
+              <a:t> </a:t>
+            </a:r>
+            <a:r>
+              <a:rPr lang="pt-BR" sz="1600" i="1" dirty="0" smtClean="0"/>
+              <a:t>do arquivo </a:t>
+            </a:r>
+            <a:r>
+              <a:rPr lang="pt-BR" sz="1600" i="1" dirty="0" smtClean="0"/>
+              <a:t>até a revisão correta</a:t>
+            </a:r>
+            <a:endParaRPr lang="pt-BR" sz="1600" i="1" dirty="0" smtClean="0"/>
           </a:p>
         </p:txBody>
       </p:sp>
@@ -18137,112 +18511,63 @@
           <a:bodyPr/>
           <a:lstStyle/>
           <a:p>
-            <a:pPr algn="just"/>
             <a:r>
               <a:rPr lang="pt-BR" sz="2400" b="1" dirty="0" smtClean="0"/>
-              <a:t>Boas práticas</a:t>
-            </a:r>
-          </a:p>
-          <a:p>
-            <a:pPr lvl="1" algn="just"/>
+              <a:t>Cenários comuns de trabalho em equipe</a:t>
+            </a:r>
+          </a:p>
+          <a:p>
+            <a:pPr marL="914400" lvl="1" indent="-457200">
+              <a:buFont typeface="+mj-lt"/>
+              <a:buAutoNum type="arabicPeriod" startAt="4"/>
+            </a:pPr>
             <a:r>
               <a:rPr lang="pt-BR" sz="2000" dirty="0" smtClean="0"/>
-              <a:t>Manter sempre o repositório atualizado (sincronizado)</a:t>
-            </a:r>
-          </a:p>
-          <a:p>
-            <a:pPr lvl="2" algn="just"/>
+              <a:t>Dois usuários realizam alterações distintas no mesmo documento</a:t>
+            </a:r>
+          </a:p>
+          <a:p>
+            <a:pPr marL="1257300" lvl="2" indent="-342900"/>
             <a:r>
               <a:rPr lang="pt-BR" sz="1600" dirty="0" smtClean="0"/>
-              <a:t>Atualizar (</a:t>
+              <a:t>Atualizar o repositório</a:t>
+            </a:r>
+          </a:p>
+          <a:p>
+            <a:pPr marL="1257300" lvl="2" indent="-342900"/>
+            <a:r>
+              <a:rPr lang="pt-BR" sz="1600" dirty="0" smtClean="0"/>
+              <a:t>Realizar a comparação </a:t>
+            </a:r>
+          </a:p>
+          <a:p>
+            <a:pPr marL="1257300" lvl="2" indent="-342900"/>
+            <a:r>
+              <a:rPr lang="pt-BR" sz="1600" dirty="0" smtClean="0"/>
+              <a:t>Comunicar o conflito para o outro usuário</a:t>
+            </a:r>
+          </a:p>
+          <a:p>
+            <a:pPr marL="1257300" lvl="2" indent="-342900"/>
+            <a:r>
+              <a:rPr lang="pt-BR" sz="1600" dirty="0" smtClean="0"/>
+              <a:t>Realizar as alterações para acomodar as mudanças de ambos usuários</a:t>
+            </a:r>
+          </a:p>
+          <a:p>
+            <a:pPr marL="1257300" lvl="2" indent="-342900"/>
+            <a:r>
+              <a:rPr lang="pt-BR" sz="1600" dirty="0" smtClean="0"/>
+              <a:t>Atualizar o documento com ambas as alterações (</a:t>
             </a:r>
             <a:r>
               <a:rPr lang="pt-BR" sz="1600" i="1" dirty="0" err="1" smtClean="0"/>
-              <a:t>update</a:t>
+              <a:t>check-in</a:t>
             </a:r>
             <a:r>
               <a:rPr lang="pt-BR" sz="1600" dirty="0" smtClean="0"/>
-              <a:t>) dos arquivos </a:t>
-            </a:r>
-            <a:r>
-              <a:rPr lang="pt-BR" sz="1600" b="1" dirty="0" smtClean="0"/>
-              <a:t>antes</a:t>
-            </a:r>
-            <a:r>
-              <a:rPr lang="pt-BR" sz="1600" dirty="0" smtClean="0"/>
-              <a:t> de utilizar e/ou modificar</a:t>
-            </a:r>
-          </a:p>
-          <a:p>
-            <a:pPr lvl="1" algn="just"/>
-            <a:r>
-              <a:rPr lang="pt-BR" sz="2000" dirty="0" smtClean="0"/>
-              <a:t>Inserir comentário listando as alterações realizadas</a:t>
-            </a:r>
-          </a:p>
-          <a:p>
-            <a:pPr lvl="1" algn="just"/>
-            <a:r>
-              <a:rPr lang="pt-BR" sz="2000" dirty="0" smtClean="0"/>
-              <a:t>Não adicionar itens ao repositório que não pertençam ao projeto</a:t>
-            </a:r>
-          </a:p>
-          <a:p>
-            <a:pPr lvl="1" algn="just"/>
-            <a:r>
-              <a:rPr lang="pt-BR" sz="2000" dirty="0" smtClean="0"/>
-              <a:t>Evitar ter muitas pastas/itens compartilhados dentro de um mesmo projeto</a:t>
-            </a:r>
-          </a:p>
-          <a:p>
-            <a:pPr lvl="1" algn="just"/>
-            <a:r>
-              <a:rPr lang="pt-BR" sz="2000" dirty="0" smtClean="0"/>
-              <a:t>Não realizar testes no repositório do projeto</a:t>
-            </a:r>
-          </a:p>
-          <a:p>
-            <a:pPr lvl="1" algn="just"/>
-            <a:r>
-              <a:rPr lang="pt-BR" sz="2000" dirty="0" smtClean="0"/>
-              <a:t>Ao realizar </a:t>
-            </a:r>
-            <a:r>
-              <a:rPr lang="en-US" sz="2000" i="1" dirty="0" smtClean="0"/>
-              <a:t>branches</a:t>
-            </a:r>
-            <a:r>
-              <a:rPr lang="pt-BR" sz="2000" dirty="0" smtClean="0"/>
-              <a:t> e </a:t>
-            </a:r>
-            <a:r>
-              <a:rPr lang="pt-BR" sz="2000" i="1" dirty="0" smtClean="0"/>
-              <a:t>merges</a:t>
-            </a:r>
-            <a:r>
-              <a:rPr lang="pt-BR" sz="2000" dirty="0" smtClean="0"/>
-              <a:t>, ou ainda grandes modificações em arquivos compartilhados, comunicar aos interessados </a:t>
-            </a:r>
-            <a:r>
-              <a:rPr lang="pt-BR" sz="2000" b="1" dirty="0" smtClean="0"/>
-              <a:t>antes</a:t>
-            </a:r>
-            <a:r>
-              <a:rPr lang="pt-BR" sz="2000" dirty="0" smtClean="0"/>
-              <a:t> de realizar a operação</a:t>
-            </a:r>
-          </a:p>
-          <a:p>
-            <a:pPr lvl="1" algn="just"/>
-            <a:endParaRPr lang="pt-BR" sz="2000" dirty="0" smtClean="0"/>
-          </a:p>
-          <a:p>
-            <a:pPr lvl="2" algn="just"/>
-            <a:endParaRPr lang="pt-BR" sz="1600" dirty="0" smtClean="0"/>
-          </a:p>
-          <a:p>
-            <a:pPr lvl="2" algn="just"/>
-            <a:endParaRPr lang="pt-BR" sz="1600" b="1" dirty="0" smtClean="0"/>
+              <a:t>)</a:t>
+            </a:r>
           </a:p>
         </p:txBody>
       </p:sp>
@@ -18294,6 +18619,325 @@
           <a:lstStyle/>
           <a:p>
             <a:r>
+              <a:rPr lang="pt-BR" b="1" dirty="0" smtClean="0"/>
+              <a:t>Controle de Versão</a:t>
+            </a:r>
+            <a:endParaRPr lang="pt-BR" b="1" dirty="0">
+              <a:effectLst>
+                <a:outerShdw blurRad="38100" dist="38100" dir="2700000" algn="tl">
+                  <a:srgbClr val="000000">
+                    <a:alpha val="43137"/>
+                  </a:srgbClr>
+                </a:outerShdw>
+              </a:effectLst>
+            </a:endParaRPr>
+          </a:p>
+        </p:txBody>
+      </p:sp>
+      <p:sp>
+        <p:nvSpPr>
+          <p:cNvPr id="12" name="Espaço Reservado para Conteúdo 11"/>
+          <p:cNvSpPr>
+            <a:spLocks noGrp="1"/>
+          </p:cNvSpPr>
+          <p:nvPr>
+            <p:ph idx="1"/>
+          </p:nvPr>
+        </p:nvSpPr>
+        <p:spPr>
+          <a:xfrm>
+            <a:off x="457200" y="1124744"/>
+            <a:ext cx="8229600" cy="3844925"/>
+          </a:xfrm>
+        </p:spPr>
+        <p:txBody>
+          <a:bodyPr/>
+          <a:lstStyle/>
+          <a:p>
+            <a:pPr algn="just"/>
+            <a:r>
+              <a:rPr lang="pt-BR" sz="2400" b="1" dirty="0" smtClean="0"/>
+              <a:t>Boas práticas</a:t>
+            </a:r>
+          </a:p>
+          <a:p>
+            <a:pPr lvl="1" algn="just"/>
+            <a:r>
+              <a:rPr lang="pt-BR" sz="2000" dirty="0" smtClean="0"/>
+              <a:t>Manter sempre o repositório atualizado (sincronizado)</a:t>
+            </a:r>
+          </a:p>
+          <a:p>
+            <a:pPr lvl="2" algn="just"/>
+            <a:r>
+              <a:rPr lang="pt-BR" sz="1600" dirty="0" smtClean="0"/>
+              <a:t>Atualizar </a:t>
+            </a:r>
+            <a:r>
+              <a:rPr lang="pt-BR" sz="1600" dirty="0" smtClean="0"/>
+              <a:t>(</a:t>
+            </a:r>
+            <a:r>
+              <a:rPr lang="pt-BR" sz="1600" i="1" dirty="0" err="1" smtClean="0"/>
+              <a:t>sync</a:t>
+            </a:r>
+            <a:r>
+              <a:rPr lang="pt-BR" sz="1600" dirty="0" smtClean="0"/>
+              <a:t>) </a:t>
+            </a:r>
+            <a:r>
+              <a:rPr lang="pt-BR" sz="1600" dirty="0" smtClean="0"/>
+              <a:t>dos arquivos </a:t>
+            </a:r>
+            <a:r>
+              <a:rPr lang="pt-BR" sz="1600" b="1" dirty="0" smtClean="0"/>
+              <a:t>antes</a:t>
+            </a:r>
+            <a:r>
+              <a:rPr lang="pt-BR" sz="1600" dirty="0" smtClean="0"/>
+              <a:t> de utilizar e/ou modificar</a:t>
+            </a:r>
+          </a:p>
+          <a:p>
+            <a:pPr lvl="1" algn="just"/>
+            <a:r>
+              <a:rPr lang="pt-BR" sz="2000" dirty="0" smtClean="0"/>
+              <a:t>Inserir comentário listando as alterações realizadas</a:t>
+            </a:r>
+          </a:p>
+          <a:p>
+            <a:pPr lvl="1" algn="just"/>
+            <a:r>
+              <a:rPr lang="pt-BR" sz="2000" dirty="0" smtClean="0"/>
+              <a:t>Não adicionar itens ao repositório que não pertençam ao projeto</a:t>
+            </a:r>
+          </a:p>
+          <a:p>
+            <a:pPr lvl="1" algn="just"/>
+            <a:r>
+              <a:rPr lang="pt-BR" sz="2000" dirty="0" smtClean="0"/>
+              <a:t>Evitar ter muitas pastas/itens compartilhados dentro de um mesmo </a:t>
+            </a:r>
+            <a:r>
+              <a:rPr lang="pt-BR" sz="2000" dirty="0" smtClean="0"/>
+              <a:t>repositório</a:t>
+            </a:r>
+            <a:endParaRPr lang="pt-BR" sz="2000" dirty="0" smtClean="0"/>
+          </a:p>
+          <a:p>
+            <a:pPr lvl="1" algn="just"/>
+            <a:r>
+              <a:rPr lang="pt-BR" sz="2000" dirty="0" smtClean="0"/>
+              <a:t>Não realizar testes no repositório do projeto</a:t>
+            </a:r>
+          </a:p>
+          <a:p>
+            <a:pPr lvl="1" algn="just"/>
+            <a:r>
+              <a:rPr lang="pt-BR" sz="2000" dirty="0" smtClean="0"/>
+              <a:t>Ao realizar </a:t>
+            </a:r>
+            <a:r>
+              <a:rPr lang="en-US" sz="2000" i="1" dirty="0" smtClean="0"/>
+              <a:t>branches</a:t>
+            </a:r>
+            <a:r>
+              <a:rPr lang="pt-BR" sz="2000" dirty="0" smtClean="0"/>
+              <a:t> e </a:t>
+            </a:r>
+            <a:r>
+              <a:rPr lang="pt-BR" sz="2000" i="1" dirty="0" smtClean="0"/>
+              <a:t>merges</a:t>
+            </a:r>
+            <a:r>
+              <a:rPr lang="pt-BR" sz="2000" dirty="0" smtClean="0"/>
+              <a:t>, ou ainda grandes modificações em arquivos compartilhados, comunicar </a:t>
+            </a:r>
+            <a:r>
+              <a:rPr lang="pt-BR" sz="2000" dirty="0" smtClean="0"/>
+              <a:t>(</a:t>
+            </a:r>
+            <a:r>
+              <a:rPr lang="pt-BR" sz="2000" i="1" dirty="0" err="1" smtClean="0"/>
+              <a:t>Pull</a:t>
+            </a:r>
+            <a:r>
+              <a:rPr lang="pt-BR" sz="2000" i="1" dirty="0" smtClean="0"/>
+              <a:t> </a:t>
+            </a:r>
+            <a:r>
+              <a:rPr lang="pt-BR" sz="2000" i="1" dirty="0" err="1" smtClean="0"/>
+              <a:t>Request</a:t>
+            </a:r>
+            <a:r>
+              <a:rPr lang="pt-BR" sz="2000" dirty="0" smtClean="0"/>
+              <a:t>) aos </a:t>
+            </a:r>
+            <a:r>
+              <a:rPr lang="pt-BR" sz="2000" dirty="0" smtClean="0"/>
+              <a:t>interessados </a:t>
+            </a:r>
+            <a:r>
+              <a:rPr lang="pt-BR" sz="2000" b="1" dirty="0" smtClean="0"/>
+              <a:t>antes</a:t>
+            </a:r>
+            <a:r>
+              <a:rPr lang="pt-BR" sz="2000" dirty="0" smtClean="0"/>
+              <a:t> de realizar a </a:t>
+            </a:r>
+            <a:r>
+              <a:rPr lang="pt-BR" sz="2000" dirty="0" smtClean="0"/>
+              <a:t>operação</a:t>
+            </a:r>
+          </a:p>
+          <a:p>
+            <a:pPr lvl="1" algn="just"/>
+            <a:r>
+              <a:rPr lang="pt-BR" sz="2000" dirty="0" smtClean="0"/>
+              <a:t>A cada novo release, criar um </a:t>
+            </a:r>
+            <a:r>
+              <a:rPr lang="pt-BR" sz="2000" i="1" dirty="0" err="1" smtClean="0"/>
+              <a:t>branch</a:t>
+            </a:r>
+            <a:r>
+              <a:rPr lang="pt-BR" sz="2000" dirty="0" smtClean="0"/>
+              <a:t> e realizar o </a:t>
+            </a:r>
+            <a:r>
+              <a:rPr lang="pt-BR" sz="2000" i="1" dirty="0" smtClean="0"/>
+              <a:t>merge</a:t>
+            </a:r>
+            <a:r>
+              <a:rPr lang="pt-BR" sz="2000" dirty="0" smtClean="0"/>
+              <a:t> com o </a:t>
+            </a:r>
+            <a:r>
+              <a:rPr lang="pt-BR" sz="2000" dirty="0" err="1" smtClean="0"/>
+              <a:t>master</a:t>
+            </a:r>
+            <a:r>
+              <a:rPr lang="pt-BR" sz="2000" dirty="0" smtClean="0"/>
+              <a:t> ao final do release</a:t>
+            </a:r>
+          </a:p>
+          <a:p>
+            <a:pPr lvl="1" algn="just"/>
+            <a:r>
+              <a:rPr lang="pt-BR" sz="2000" dirty="0" smtClean="0"/>
+              <a:t>O </a:t>
+            </a:r>
+            <a:r>
+              <a:rPr lang="pt-BR" sz="2000" i="1" dirty="0" err="1" smtClean="0"/>
+              <a:t>branch</a:t>
+            </a:r>
+            <a:r>
+              <a:rPr lang="pt-BR" sz="2000" dirty="0" smtClean="0"/>
+              <a:t> </a:t>
+            </a:r>
+            <a:r>
+              <a:rPr lang="pt-BR" sz="2000" dirty="0" err="1" smtClean="0"/>
+              <a:t>master</a:t>
+            </a:r>
+            <a:r>
+              <a:rPr lang="pt-BR" sz="2000" dirty="0" smtClean="0"/>
+              <a:t> deve SEMPRE estar com uma versão funcional!</a:t>
+            </a:r>
+          </a:p>
+          <a:p>
+            <a:pPr lvl="1" algn="just"/>
+            <a:r>
+              <a:rPr lang="pt-BR" sz="2000" dirty="0" smtClean="0"/>
+              <a:t>Cada macaco no seu galho! </a:t>
+            </a:r>
+            <a:r>
+              <a:rPr lang="pt-BR" sz="2000" dirty="0" err="1" smtClean="0"/>
+              <a:t>Ops</a:t>
+            </a:r>
+            <a:r>
+              <a:rPr lang="pt-BR" sz="2000" dirty="0" smtClean="0"/>
+              <a:t>... Cada </a:t>
+            </a:r>
+            <a:r>
+              <a:rPr lang="pt-BR" sz="2000" dirty="0" err="1" smtClean="0"/>
+              <a:t>sub-equipe</a:t>
+            </a:r>
+            <a:r>
+              <a:rPr lang="pt-BR" sz="2000" dirty="0" smtClean="0"/>
+              <a:t> com seu </a:t>
+            </a:r>
+            <a:r>
+              <a:rPr lang="pt-BR" sz="2000" i="1" dirty="0" err="1" smtClean="0"/>
+              <a:t>branch</a:t>
+            </a:r>
+            <a:r>
+              <a:rPr lang="pt-BR" sz="2000" dirty="0" smtClean="0"/>
+              <a:t>!</a:t>
+            </a:r>
+            <a:endParaRPr lang="pt-BR" sz="2000" dirty="0" smtClean="0"/>
+          </a:p>
+          <a:p>
+            <a:pPr lvl="1" algn="just"/>
+            <a:endParaRPr lang="pt-BR" sz="2000" dirty="0" smtClean="0"/>
+          </a:p>
+          <a:p>
+            <a:pPr lvl="2" algn="just"/>
+            <a:endParaRPr lang="pt-BR" sz="1600" dirty="0" smtClean="0"/>
+          </a:p>
+          <a:p>
+            <a:pPr lvl="2" algn="just"/>
+            <a:endParaRPr lang="pt-BR" sz="1600" b="1" dirty="0" smtClean="0"/>
+          </a:p>
+        </p:txBody>
+      </p:sp>
+    </p:spTree>
+  </p:cSld>
+  <p:clrMapOvr>
+    <a:masterClrMapping/>
+  </p:clrMapOvr>
+  <p:timing>
+    <p:tnLst>
+      <p:par>
+        <p:cTn id="1" dur="indefinite" restart="never" nodeType="tmRoot"/>
+      </p:par>
+    </p:tnLst>
+  </p:timing>
+</p:sld>
+</file>
+
+<file path=ppt/slides/slide17.xml><?xml version="1.0" encoding="utf-8"?>
+<p:sld xmlns:a="http://schemas.openxmlformats.org/drawingml/2006/main" xmlns:r="http://schemas.openxmlformats.org/officeDocument/2006/relationships" xmlns:p="http://schemas.openxmlformats.org/presentationml/2006/main">
+  <p:cSld>
+    <p:spTree>
+      <p:nvGrpSpPr>
+        <p:cNvPr id="1" name=""/>
+        <p:cNvGrpSpPr/>
+        <p:nvPr/>
+      </p:nvGrpSpPr>
+      <p:grpSpPr>
+        <a:xfrm>
+          <a:off x="0" y="0"/>
+          <a:ext cx="0" cy="0"/>
+          <a:chOff x="0" y="0"/>
+          <a:chExt cx="0" cy="0"/>
+        </a:xfrm>
+      </p:grpSpPr>
+      <p:sp>
+        <p:nvSpPr>
+          <p:cNvPr id="2" name="Título 1"/>
+          <p:cNvSpPr>
+            <a:spLocks noGrp="1"/>
+          </p:cNvSpPr>
+          <p:nvPr>
+            <p:ph type="title"/>
+          </p:nvPr>
+        </p:nvSpPr>
+        <p:spPr/>
+        <p:txBody>
+          <a:bodyPr/>
+          <a:lstStyle/>
+          <a:p>
+            <a:r>
               <a:rPr lang="pt-BR" dirty="0" smtClean="0">
                 <a:effectLst>
                   <a:outerShdw blurRad="38100" dist="38100" dir="2700000" algn="tl">
@@ -18400,7 +19044,158 @@
 </p:sld>
 </file>
 
-<file path=ppt/slides/slide17.xml><?xml version="1.0" encoding="utf-8"?>
+<file path=ppt/slides/slide18.xml><?xml version="1.0" encoding="utf-8"?>
+<p:sld xmlns:a="http://schemas.openxmlformats.org/drawingml/2006/main" xmlns:r="http://schemas.openxmlformats.org/officeDocument/2006/relationships" xmlns:p="http://schemas.openxmlformats.org/presentationml/2006/main">
+  <p:cSld>
+    <p:spTree>
+      <p:nvGrpSpPr>
+        <p:cNvPr id="1" name=""/>
+        <p:cNvGrpSpPr/>
+        <p:nvPr/>
+      </p:nvGrpSpPr>
+      <p:grpSpPr>
+        <a:xfrm>
+          <a:off x="0" y="0"/>
+          <a:ext cx="0" cy="0"/>
+          <a:chOff x="0" y="0"/>
+          <a:chExt cx="0" cy="0"/>
+        </a:xfrm>
+      </p:grpSpPr>
+      <p:sp>
+        <p:nvSpPr>
+          <p:cNvPr id="2" name="Título 1"/>
+          <p:cNvSpPr>
+            <a:spLocks noGrp="1"/>
+          </p:cNvSpPr>
+          <p:nvPr>
+            <p:ph type="ctrTitle"/>
+          </p:nvPr>
+        </p:nvSpPr>
+        <p:spPr>
+          <a:xfrm>
+            <a:off x="685800" y="2463031"/>
+            <a:ext cx="7772400" cy="1470025"/>
+          </a:xfrm>
+        </p:spPr>
+        <p:txBody>
+          <a:bodyPr>
+            <a:normAutofit/>
+          </a:bodyPr>
+          <a:lstStyle/>
+          <a:p>
+            <a:r>
+              <a:rPr lang="pt-BR" dirty="0" smtClean="0"/>
+              <a:t>Controle </a:t>
+            </a:r>
+            <a:r>
+              <a:rPr lang="pt-BR" dirty="0" smtClean="0"/>
+              <a:t>de Versão</a:t>
+            </a:r>
+            <a:endParaRPr lang="pt-BR" dirty="0"/>
+          </a:p>
+        </p:txBody>
+      </p:sp>
+      <p:sp>
+        <p:nvSpPr>
+          <p:cNvPr id="3" name="Subtítulo 2"/>
+          <p:cNvSpPr>
+            <a:spLocks noGrp="1"/>
+          </p:cNvSpPr>
+          <p:nvPr>
+            <p:ph type="subTitle" idx="1"/>
+          </p:nvPr>
+        </p:nvSpPr>
+        <p:spPr>
+          <a:xfrm>
+            <a:off x="897360" y="4060052"/>
+            <a:ext cx="7560840" cy="864096"/>
+          </a:xfrm>
+        </p:spPr>
+        <p:txBody>
+          <a:bodyPr>
+            <a:normAutofit/>
+          </a:bodyPr>
+          <a:lstStyle/>
+          <a:p>
+            <a:r>
+              <a:rPr lang="pt-BR" sz="2800" dirty="0" err="1" smtClean="0"/>
+              <a:t>DSc</a:t>
+            </a:r>
+            <a:r>
+              <a:rPr lang="pt-BR" sz="2800" dirty="0" smtClean="0"/>
+              <a:t>. Breno de França</a:t>
+            </a:r>
+            <a:endParaRPr lang="pt-BR" sz="2800" dirty="0" smtClean="0"/>
+          </a:p>
+        </p:txBody>
+      </p:sp>
+      <p:pic>
+        <p:nvPicPr>
+          <p:cNvPr id="6" name="Imagem 5"/>
+          <p:cNvPicPr/>
+          <p:nvPr/>
+        </p:nvPicPr>
+        <p:blipFill>
+          <a:blip r:embed="rId2" cstate="print"/>
+          <a:srcRect/>
+          <a:stretch>
+            <a:fillRect/>
+          </a:stretch>
+        </p:blipFill>
+        <p:spPr bwMode="auto">
+          <a:xfrm>
+            <a:off x="395536" y="638104"/>
+            <a:ext cx="2232248" cy="864096"/>
+          </a:xfrm>
+          <a:prstGeom prst="rect">
+            <a:avLst/>
+          </a:prstGeom>
+          <a:noFill/>
+        </p:spPr>
+      </p:pic>
+      <p:pic>
+        <p:nvPicPr>
+          <p:cNvPr id="7" name="Imagem 6" descr="ESE_logomarca.jpg"/>
+          <p:cNvPicPr/>
+          <p:nvPr/>
+        </p:nvPicPr>
+        <p:blipFill>
+          <a:blip r:embed="rId3" cstate="print"/>
+          <a:stretch>
+            <a:fillRect/>
+          </a:stretch>
+        </p:blipFill>
+        <p:spPr>
+          <a:xfrm>
+            <a:off x="6800480" y="782120"/>
+            <a:ext cx="2088232" cy="720080"/>
+          </a:xfrm>
+          <a:prstGeom prst="rect">
+            <a:avLst/>
+          </a:prstGeom>
+        </p:spPr>
+      </p:pic>
+    </p:spTree>
+    <p:extLst>
+      <p:ext uri="{BB962C8B-B14F-4D97-AF65-F5344CB8AC3E}">
+        <p14:creationId xmlns:p14="http://schemas.microsoft.com/office/powerpoint/2010/main" val="1167244958"/>
+      </p:ext>
+    </p:extLst>
+  </p:cSld>
+  <p:clrMapOvr>
+    <a:masterClrMapping/>
+  </p:clrMapOvr>
+  <p:timing>
+    <p:tnLst>
+      <p:par>
+        <p:cTn id="1" dur="indefinite" restart="never" nodeType="tmRoot"/>
+      </p:par>
+    </p:tnLst>
+  </p:timing>
+</p:sld>
+</file>
+
+<file path=ppt/slides/slide19.xml><?xml version="1.0" encoding="utf-8"?>
 <p:sld xmlns:a="http://schemas.openxmlformats.org/drawingml/2006/main" xmlns:r="http://schemas.openxmlformats.org/officeDocument/2006/relationships" xmlns:p="http://schemas.openxmlformats.org/presentationml/2006/main">
   <p:cSld>
     <p:spTree>
@@ -18689,7 +19484,637 @@
 </p:sld>
 </file>
 
-<file path=ppt/slides/slide18.xml><?xml version="1.0" encoding="utf-8"?>
+<file path=ppt/slides/slide2.xml><?xml version="1.0" encoding="utf-8"?>
+<p:sld xmlns:a="http://schemas.openxmlformats.org/drawingml/2006/main" xmlns:r="http://schemas.openxmlformats.org/officeDocument/2006/relationships" xmlns:p="http://schemas.openxmlformats.org/presentationml/2006/main">
+  <p:cSld>
+    <p:spTree>
+      <p:nvGrpSpPr>
+        <p:cNvPr id="1" name=""/>
+        <p:cNvGrpSpPr/>
+        <p:nvPr/>
+      </p:nvGrpSpPr>
+      <p:grpSpPr>
+        <a:xfrm>
+          <a:off x="0" y="0"/>
+          <a:ext cx="0" cy="0"/>
+          <a:chOff x="0" y="0"/>
+          <a:chExt cx="0" cy="0"/>
+        </a:xfrm>
+      </p:grpSpPr>
+      <p:sp>
+        <p:nvSpPr>
+          <p:cNvPr id="2" name="Título 1"/>
+          <p:cNvSpPr>
+            <a:spLocks noGrp="1"/>
+          </p:cNvSpPr>
+          <p:nvPr>
+            <p:ph type="title"/>
+          </p:nvPr>
+        </p:nvSpPr>
+        <p:spPr/>
+        <p:txBody>
+          <a:bodyPr/>
+          <a:lstStyle/>
+          <a:p>
+            <a:r>
+              <a:rPr lang="pt-BR" dirty="0" smtClean="0">
+                <a:effectLst>
+                  <a:outerShdw blurRad="38100" dist="38100" dir="2700000" algn="tl">
+                    <a:srgbClr val="000000">
+                      <a:alpha val="43137"/>
+                    </a:srgbClr>
+                  </a:outerShdw>
+                </a:effectLst>
+              </a:rPr>
+              <a:t>Controle de Versão de Artefatos</a:t>
+            </a:r>
+            <a:endParaRPr lang="pt-BR" dirty="0">
+              <a:effectLst>
+                <a:outerShdw blurRad="38100" dist="38100" dir="2700000" algn="tl">
+                  <a:srgbClr val="000000">
+                    <a:alpha val="43137"/>
+                  </a:srgbClr>
+                </a:outerShdw>
+              </a:effectLst>
+            </a:endParaRPr>
+          </a:p>
+        </p:txBody>
+      </p:sp>
+      <p:sp>
+        <p:nvSpPr>
+          <p:cNvPr id="3" name="Espaço Reservado para Conteúdo 2"/>
+          <p:cNvSpPr>
+            <a:spLocks noGrp="1"/>
+          </p:cNvSpPr>
+          <p:nvPr>
+            <p:ph idx="1"/>
+          </p:nvPr>
+        </p:nvSpPr>
+        <p:spPr/>
+        <p:txBody>
+          <a:bodyPr/>
+          <a:lstStyle/>
+          <a:p>
+            <a:endParaRPr lang="pt-BR" sz="2000" dirty="0" smtClean="0"/>
+          </a:p>
+          <a:p>
+            <a:endParaRPr lang="pt-BR" sz="2000" dirty="0" smtClean="0"/>
+          </a:p>
+          <a:p>
+            <a:endParaRPr lang="pt-BR" sz="2000" dirty="0" smtClean="0"/>
+          </a:p>
+          <a:p>
+            <a:endParaRPr lang="pt-BR" sz="2000" dirty="0" smtClean="0"/>
+          </a:p>
+          <a:p>
+            <a:endParaRPr lang="pt-BR" sz="2000" dirty="0" smtClean="0"/>
+          </a:p>
+          <a:p>
+            <a:endParaRPr lang="pt-BR" sz="2000" dirty="0" smtClean="0"/>
+          </a:p>
+          <a:p>
+            <a:endParaRPr lang="pt-BR" sz="2000" dirty="0" smtClean="0"/>
+          </a:p>
+          <a:p>
+            <a:endParaRPr lang="pt-BR" sz="2000" dirty="0" smtClean="0"/>
+          </a:p>
+        </p:txBody>
+      </p:sp>
+      <p:sp>
+        <p:nvSpPr>
+          <p:cNvPr id="5" name="Fluxograma: Disco magnético 4"/>
+          <p:cNvSpPr/>
+          <p:nvPr/>
+        </p:nvSpPr>
+        <p:spPr>
+          <a:xfrm>
+            <a:off x="6372200" y="2996952"/>
+            <a:ext cx="1800200" cy="1440160"/>
+          </a:xfrm>
+          <a:prstGeom prst="flowChartMagneticDisk">
+            <a:avLst/>
+          </a:prstGeom>
+          <a:noFill/>
+        </p:spPr>
+        <p:style>
+          <a:lnRef idx="2">
+            <a:schemeClr val="accent1">
+              <a:shade val="50000"/>
+            </a:schemeClr>
+          </a:lnRef>
+          <a:fillRef idx="1">
+            <a:schemeClr val="accent1"/>
+          </a:fillRef>
+          <a:effectRef idx="0">
+            <a:schemeClr val="accent1"/>
+          </a:effectRef>
+          <a:fontRef idx="minor">
+            <a:schemeClr val="lt1"/>
+          </a:fontRef>
+        </p:style>
+        <p:txBody>
+          <a:bodyPr rtlCol="0" anchor="ctr"/>
+          <a:lstStyle/>
+          <a:p>
+            <a:pPr algn="ctr"/>
+            <a:r>
+              <a:rPr lang="pt-BR" dirty="0" smtClean="0">
+                <a:solidFill>
+                  <a:schemeClr val="tx1"/>
+                </a:solidFill>
+              </a:rPr>
+              <a:t>Repositório de Artefatos (Servidor)</a:t>
+            </a:r>
+            <a:endParaRPr lang="pt-BR" dirty="0">
+              <a:solidFill>
+                <a:schemeClr val="tx1"/>
+              </a:solidFill>
+            </a:endParaRPr>
+          </a:p>
+        </p:txBody>
+      </p:sp>
+      <p:pic>
+        <p:nvPicPr>
+          <p:cNvPr id="1026" name="Picture 2" descr="C:\Users\bfranca.LENS-ESE\AppData\Local\Microsoft\Windows\Temporary Internet Files\Content.IE5\62KHBMWX\MC900433944[1].png"/>
+          <p:cNvPicPr>
+            <a:picLocks noChangeAspect="1" noChangeArrowheads="1"/>
+          </p:cNvPicPr>
+          <p:nvPr/>
+        </p:nvPicPr>
+        <p:blipFill>
+          <a:blip r:embed="rId2" cstate="print"/>
+          <a:srcRect/>
+          <a:stretch>
+            <a:fillRect/>
+          </a:stretch>
+        </p:blipFill>
+        <p:spPr bwMode="auto">
+          <a:xfrm>
+            <a:off x="1115616" y="4653136"/>
+            <a:ext cx="1080120" cy="1080120"/>
+          </a:xfrm>
+          <a:prstGeom prst="rect">
+            <a:avLst/>
+          </a:prstGeom>
+          <a:noFill/>
+        </p:spPr>
+      </p:pic>
+      <p:pic>
+        <p:nvPicPr>
+          <p:cNvPr id="1027" name="Picture 3" descr="C:\Users\bfranca.LENS-ESE\AppData\Local\Microsoft\Windows\Temporary Internet Files\Content.IE5\TGO0ZPJZ\MC900433942[1].png"/>
+          <p:cNvPicPr>
+            <a:picLocks noChangeAspect="1" noChangeArrowheads="1"/>
+          </p:cNvPicPr>
+          <p:nvPr/>
+        </p:nvPicPr>
+        <p:blipFill>
+          <a:blip r:embed="rId3" cstate="print"/>
+          <a:srcRect/>
+          <a:stretch>
+            <a:fillRect/>
+          </a:stretch>
+        </p:blipFill>
+        <p:spPr bwMode="auto">
+          <a:xfrm>
+            <a:off x="611560" y="2996952"/>
+            <a:ext cx="1152128" cy="1152128"/>
+          </a:xfrm>
+          <a:prstGeom prst="rect">
+            <a:avLst/>
+          </a:prstGeom>
+          <a:noFill/>
+        </p:spPr>
+      </p:pic>
+      <p:pic>
+        <p:nvPicPr>
+          <p:cNvPr id="1028" name="Picture 4" descr="C:\Users\bfranca.LENS-ESE\AppData\Local\Microsoft\Windows\Temporary Internet Files\Content.IE5\OW7UR996\MC900433943[1].png"/>
+          <p:cNvPicPr>
+            <a:picLocks noChangeAspect="1" noChangeArrowheads="1"/>
+          </p:cNvPicPr>
+          <p:nvPr/>
+        </p:nvPicPr>
+        <p:blipFill>
+          <a:blip r:embed="rId4" cstate="print"/>
+          <a:srcRect/>
+          <a:stretch>
+            <a:fillRect/>
+          </a:stretch>
+        </p:blipFill>
+        <p:spPr bwMode="auto">
+          <a:xfrm>
+            <a:off x="1043608" y="1628800"/>
+            <a:ext cx="850404" cy="850404"/>
+          </a:xfrm>
+          <a:prstGeom prst="rect">
+            <a:avLst/>
+          </a:prstGeom>
+          <a:noFill/>
+        </p:spPr>
+      </p:pic>
+      <p:sp>
+        <p:nvSpPr>
+          <p:cNvPr id="11" name="Fluxograma: Disco magnético 10"/>
+          <p:cNvSpPr/>
+          <p:nvPr/>
+        </p:nvSpPr>
+        <p:spPr>
+          <a:xfrm>
+            <a:off x="2339752" y="4797152"/>
+            <a:ext cx="1080120" cy="720080"/>
+          </a:xfrm>
+          <a:prstGeom prst="flowChartMagneticDisk">
+            <a:avLst/>
+          </a:prstGeom>
+          <a:noFill/>
+        </p:spPr>
+        <p:style>
+          <a:lnRef idx="2">
+            <a:schemeClr val="accent1">
+              <a:shade val="50000"/>
+            </a:schemeClr>
+          </a:lnRef>
+          <a:fillRef idx="1">
+            <a:schemeClr val="accent1"/>
+          </a:fillRef>
+          <a:effectRef idx="0">
+            <a:schemeClr val="accent1"/>
+          </a:effectRef>
+          <a:fontRef idx="minor">
+            <a:schemeClr val="lt1"/>
+          </a:fontRef>
+        </p:style>
+        <p:txBody>
+          <a:bodyPr rtlCol="0" anchor="ctr"/>
+          <a:lstStyle/>
+          <a:p>
+            <a:pPr algn="ctr"/>
+            <a:r>
+              <a:rPr lang="pt-BR" sz="1400" dirty="0" err="1" smtClean="0">
+                <a:solidFill>
+                  <a:schemeClr val="tx1"/>
+                </a:solidFill>
+              </a:rPr>
+              <a:t>Workspace</a:t>
+            </a:r>
+            <a:r>
+              <a:rPr lang="pt-BR" sz="1400" dirty="0" smtClean="0">
+                <a:solidFill>
+                  <a:schemeClr val="tx1"/>
+                </a:solidFill>
+              </a:rPr>
+              <a:t> (Local)</a:t>
+            </a:r>
+            <a:endParaRPr lang="pt-BR" sz="1400" dirty="0">
+              <a:solidFill>
+                <a:schemeClr val="tx1"/>
+              </a:solidFill>
+            </a:endParaRPr>
+          </a:p>
+        </p:txBody>
+      </p:sp>
+      <p:sp>
+        <p:nvSpPr>
+          <p:cNvPr id="13" name="Fluxograma: Disco magnético 12"/>
+          <p:cNvSpPr/>
+          <p:nvPr/>
+        </p:nvSpPr>
+        <p:spPr>
+          <a:xfrm>
+            <a:off x="1763688" y="3212976"/>
+            <a:ext cx="1080120" cy="720080"/>
+          </a:xfrm>
+          <a:prstGeom prst="flowChartMagneticDisk">
+            <a:avLst/>
+          </a:prstGeom>
+          <a:noFill/>
+        </p:spPr>
+        <p:style>
+          <a:lnRef idx="2">
+            <a:schemeClr val="accent1">
+              <a:shade val="50000"/>
+            </a:schemeClr>
+          </a:lnRef>
+          <a:fillRef idx="1">
+            <a:schemeClr val="accent1"/>
+          </a:fillRef>
+          <a:effectRef idx="0">
+            <a:schemeClr val="accent1"/>
+          </a:effectRef>
+          <a:fontRef idx="minor">
+            <a:schemeClr val="lt1"/>
+          </a:fontRef>
+        </p:style>
+        <p:txBody>
+          <a:bodyPr rtlCol="0" anchor="ctr"/>
+          <a:lstStyle/>
+          <a:p>
+            <a:pPr algn="ctr"/>
+            <a:r>
+              <a:rPr lang="pt-BR" sz="1400" dirty="0" err="1" smtClean="0">
+                <a:solidFill>
+                  <a:schemeClr val="tx1"/>
+                </a:solidFill>
+              </a:rPr>
+              <a:t>Workspace</a:t>
+            </a:r>
+            <a:r>
+              <a:rPr lang="pt-BR" sz="1400" dirty="0" smtClean="0">
+                <a:solidFill>
+                  <a:schemeClr val="tx1"/>
+                </a:solidFill>
+              </a:rPr>
+              <a:t> (Local)</a:t>
+            </a:r>
+            <a:endParaRPr lang="pt-BR" sz="1400" dirty="0">
+              <a:solidFill>
+                <a:schemeClr val="tx1"/>
+              </a:solidFill>
+            </a:endParaRPr>
+          </a:p>
+        </p:txBody>
+      </p:sp>
+      <p:sp>
+        <p:nvSpPr>
+          <p:cNvPr id="14" name="Fluxograma: Disco magnético 13"/>
+          <p:cNvSpPr/>
+          <p:nvPr/>
+        </p:nvSpPr>
+        <p:spPr>
+          <a:xfrm>
+            <a:off x="2051720" y="1772816"/>
+            <a:ext cx="1080120" cy="720080"/>
+          </a:xfrm>
+          <a:prstGeom prst="flowChartMagneticDisk">
+            <a:avLst/>
+          </a:prstGeom>
+          <a:noFill/>
+        </p:spPr>
+        <p:style>
+          <a:lnRef idx="2">
+            <a:schemeClr val="accent1">
+              <a:shade val="50000"/>
+            </a:schemeClr>
+          </a:lnRef>
+          <a:fillRef idx="1">
+            <a:schemeClr val="accent1"/>
+          </a:fillRef>
+          <a:effectRef idx="0">
+            <a:schemeClr val="accent1"/>
+          </a:effectRef>
+          <a:fontRef idx="minor">
+            <a:schemeClr val="lt1"/>
+          </a:fontRef>
+        </p:style>
+        <p:txBody>
+          <a:bodyPr rtlCol="0" anchor="ctr"/>
+          <a:lstStyle/>
+          <a:p>
+            <a:pPr algn="ctr"/>
+            <a:r>
+              <a:rPr lang="pt-BR" sz="1400" dirty="0" err="1" smtClean="0">
+                <a:solidFill>
+                  <a:schemeClr val="tx1"/>
+                </a:solidFill>
+              </a:rPr>
+              <a:t>Workspace</a:t>
+            </a:r>
+            <a:r>
+              <a:rPr lang="pt-BR" sz="1400" dirty="0" smtClean="0">
+                <a:solidFill>
+                  <a:schemeClr val="tx1"/>
+                </a:solidFill>
+              </a:rPr>
+              <a:t> (Local)</a:t>
+            </a:r>
+            <a:endParaRPr lang="pt-BR" sz="1400" dirty="0">
+              <a:solidFill>
+                <a:schemeClr val="tx1"/>
+              </a:solidFill>
+            </a:endParaRPr>
+          </a:p>
+        </p:txBody>
+      </p:sp>
+      <p:cxnSp>
+        <p:nvCxnSpPr>
+          <p:cNvPr id="16" name="Conector de seta reta 15"/>
+          <p:cNvCxnSpPr>
+            <a:stCxn id="14" idx="4"/>
+          </p:cNvCxnSpPr>
+          <p:nvPr/>
+        </p:nvCxnSpPr>
+        <p:spPr>
+          <a:xfrm>
+            <a:off x="3131840" y="2132856"/>
+            <a:ext cx="3240360" cy="1296144"/>
+          </a:xfrm>
+          <a:prstGeom prst="straightConnector1">
+            <a:avLst/>
+          </a:prstGeom>
+          <a:ln w="28575">
+            <a:prstDash val="sysDash"/>
+            <a:tailEnd type="arrow"/>
+          </a:ln>
+        </p:spPr>
+        <p:style>
+          <a:lnRef idx="1">
+            <a:schemeClr val="accent1"/>
+          </a:lnRef>
+          <a:fillRef idx="0">
+            <a:schemeClr val="accent1"/>
+          </a:fillRef>
+          <a:effectRef idx="0">
+            <a:schemeClr val="accent1"/>
+          </a:effectRef>
+          <a:fontRef idx="minor">
+            <a:schemeClr val="tx1"/>
+          </a:fontRef>
+        </p:style>
+      </p:cxnSp>
+      <p:sp>
+        <p:nvSpPr>
+          <p:cNvPr id="17" name="CaixaDeTexto 16"/>
+          <p:cNvSpPr txBox="1"/>
+          <p:nvPr/>
+        </p:nvSpPr>
+        <p:spPr>
+          <a:xfrm>
+            <a:off x="4355976" y="2276872"/>
+            <a:ext cx="1568058" cy="307777"/>
+          </a:xfrm>
+          <a:prstGeom prst="rect">
+            <a:avLst/>
+          </a:prstGeom>
+          <a:noFill/>
+        </p:spPr>
+        <p:txBody>
+          <a:bodyPr wrap="none" rtlCol="0">
+            <a:spAutoFit/>
+          </a:bodyPr>
+          <a:lstStyle/>
+          <a:p>
+            <a:r>
+              <a:rPr lang="pt-BR" sz="1400" b="1" dirty="0" smtClean="0"/>
+              <a:t>ADD (Adicionar)</a:t>
+            </a:r>
+            <a:endParaRPr lang="pt-BR" sz="1400" b="1" dirty="0"/>
+          </a:p>
+        </p:txBody>
+      </p:sp>
+      <p:cxnSp>
+        <p:nvCxnSpPr>
+          <p:cNvPr id="18" name="Conector de seta reta 17"/>
+          <p:cNvCxnSpPr>
+            <a:stCxn id="13" idx="4"/>
+            <a:endCxn id="5" idx="2"/>
+          </p:cNvCxnSpPr>
+          <p:nvPr/>
+        </p:nvCxnSpPr>
+        <p:spPr>
+          <a:xfrm>
+            <a:off x="2843808" y="3573016"/>
+            <a:ext cx="3528392" cy="144016"/>
+          </a:xfrm>
+          <a:prstGeom prst="straightConnector1">
+            <a:avLst/>
+          </a:prstGeom>
+          <a:ln w="28575">
+            <a:prstDash val="sysDash"/>
+            <a:tailEnd type="arrow"/>
+          </a:ln>
+        </p:spPr>
+        <p:style>
+          <a:lnRef idx="1">
+            <a:schemeClr val="accent1"/>
+          </a:lnRef>
+          <a:fillRef idx="0">
+            <a:schemeClr val="accent1"/>
+          </a:fillRef>
+          <a:effectRef idx="0">
+            <a:schemeClr val="accent1"/>
+          </a:effectRef>
+          <a:fontRef idx="minor">
+            <a:schemeClr val="tx1"/>
+          </a:fontRef>
+        </p:style>
+      </p:cxnSp>
+      <p:sp>
+        <p:nvSpPr>
+          <p:cNvPr id="21" name="CaixaDeTexto 20"/>
+          <p:cNvSpPr txBox="1"/>
+          <p:nvPr/>
+        </p:nvSpPr>
+        <p:spPr>
+          <a:xfrm>
+            <a:off x="3779912" y="3284984"/>
+            <a:ext cx="1848583" cy="307777"/>
+          </a:xfrm>
+          <a:prstGeom prst="rect">
+            <a:avLst/>
+          </a:prstGeom>
+          <a:noFill/>
+        </p:spPr>
+        <p:txBody>
+          <a:bodyPr wrap="none" rtlCol="0">
+            <a:spAutoFit/>
+          </a:bodyPr>
+          <a:lstStyle/>
+          <a:p>
+            <a:r>
+              <a:rPr lang="pt-BR" sz="1400" b="1" dirty="0" err="1" smtClean="0"/>
+              <a:t>Commit</a:t>
+            </a:r>
+            <a:r>
+              <a:rPr lang="pt-BR" sz="1400" b="1" dirty="0" smtClean="0"/>
+              <a:t> (Submeter)</a:t>
+            </a:r>
+            <a:endParaRPr lang="pt-BR" sz="1400" b="1" dirty="0"/>
+          </a:p>
+        </p:txBody>
+      </p:sp>
+      <p:cxnSp>
+        <p:nvCxnSpPr>
+          <p:cNvPr id="22" name="Conector de seta reta 21"/>
+          <p:cNvCxnSpPr/>
+          <p:nvPr/>
+        </p:nvCxnSpPr>
+        <p:spPr>
+          <a:xfrm rot="10800000" flipV="1">
+            <a:off x="3419872" y="4077072"/>
+            <a:ext cx="2952328" cy="1080120"/>
+          </a:xfrm>
+          <a:prstGeom prst="straightConnector1">
+            <a:avLst/>
+          </a:prstGeom>
+          <a:ln w="28575">
+            <a:prstDash val="sysDash"/>
+            <a:tailEnd type="arrow"/>
+          </a:ln>
+        </p:spPr>
+        <p:style>
+          <a:lnRef idx="1">
+            <a:schemeClr val="accent1"/>
+          </a:lnRef>
+          <a:fillRef idx="0">
+            <a:schemeClr val="accent1"/>
+          </a:fillRef>
+          <a:effectRef idx="0">
+            <a:schemeClr val="accent1"/>
+          </a:effectRef>
+          <a:fontRef idx="minor">
+            <a:schemeClr val="tx1"/>
+          </a:fontRef>
+        </p:style>
+      </p:cxnSp>
+      <p:sp>
+        <p:nvSpPr>
+          <p:cNvPr id="25" name="CaixaDeTexto 24"/>
+          <p:cNvSpPr txBox="1"/>
+          <p:nvPr/>
+        </p:nvSpPr>
+        <p:spPr>
+          <a:xfrm>
+            <a:off x="3635896" y="4221088"/>
+            <a:ext cx="1845377" cy="307777"/>
+          </a:xfrm>
+          <a:prstGeom prst="rect">
+            <a:avLst/>
+          </a:prstGeom>
+          <a:noFill/>
+        </p:spPr>
+        <p:txBody>
+          <a:bodyPr wrap="none" rtlCol="0">
+            <a:spAutoFit/>
+          </a:bodyPr>
+          <a:lstStyle/>
+          <a:p>
+            <a:r>
+              <a:rPr lang="pt-BR" sz="1400" b="1" dirty="0" err="1" smtClean="0"/>
+              <a:t>Update</a:t>
+            </a:r>
+            <a:r>
+              <a:rPr lang="pt-BR" sz="1400" b="1" dirty="0" smtClean="0"/>
+              <a:t> (Recuperar)</a:t>
+            </a:r>
+            <a:endParaRPr lang="pt-BR" sz="1400" b="1" dirty="0"/>
+          </a:p>
+        </p:txBody>
+      </p:sp>
+    </p:spTree>
+  </p:cSld>
+  <p:clrMapOvr>
+    <a:masterClrMapping/>
+  </p:clrMapOvr>
+  <p:timing>
+    <p:tnLst>
+      <p:par>
+        <p:cTn id="1" dur="indefinite" restart="never" nodeType="tmRoot"/>
+      </p:par>
+    </p:tnLst>
+  </p:timing>
+</p:sld>
+</file>
+
+<file path=ppt/slides/slide20.xml><?xml version="1.0" encoding="utf-8"?>
 <p:sld xmlns:a="http://schemas.openxmlformats.org/drawingml/2006/main" xmlns:r="http://schemas.openxmlformats.org/officeDocument/2006/relationships" xmlns:p="http://schemas.openxmlformats.org/presentationml/2006/main">
   <p:cSld>
     <p:spTree>
@@ -18930,7 +20355,7 @@
 </p:sld>
 </file>
 
-<file path=ppt/slides/slide19.xml><?xml version="1.0" encoding="utf-8"?>
+<file path=ppt/slides/slide21.xml><?xml version="1.0" encoding="utf-8"?>
 <p:sld xmlns:a="http://schemas.openxmlformats.org/drawingml/2006/main" xmlns:r="http://schemas.openxmlformats.org/officeDocument/2006/relationships" xmlns:p="http://schemas.openxmlformats.org/presentationml/2006/main">
   <p:cSld>
     <p:spTree>
@@ -19496,637 +20921,7 @@
 </p:sld>
 </file>
 
-<file path=ppt/slides/slide2.xml><?xml version="1.0" encoding="utf-8"?>
-<p:sld xmlns:a="http://schemas.openxmlformats.org/drawingml/2006/main" xmlns:r="http://schemas.openxmlformats.org/officeDocument/2006/relationships" xmlns:p="http://schemas.openxmlformats.org/presentationml/2006/main">
-  <p:cSld>
-    <p:spTree>
-      <p:nvGrpSpPr>
-        <p:cNvPr id="1" name=""/>
-        <p:cNvGrpSpPr/>
-        <p:nvPr/>
-      </p:nvGrpSpPr>
-      <p:grpSpPr>
-        <a:xfrm>
-          <a:off x="0" y="0"/>
-          <a:ext cx="0" cy="0"/>
-          <a:chOff x="0" y="0"/>
-          <a:chExt cx="0" cy="0"/>
-        </a:xfrm>
-      </p:grpSpPr>
-      <p:sp>
-        <p:nvSpPr>
-          <p:cNvPr id="2" name="Título 1"/>
-          <p:cNvSpPr>
-            <a:spLocks noGrp="1"/>
-          </p:cNvSpPr>
-          <p:nvPr>
-            <p:ph type="title"/>
-          </p:nvPr>
-        </p:nvSpPr>
-        <p:spPr/>
-        <p:txBody>
-          <a:bodyPr/>
-          <a:lstStyle/>
-          <a:p>
-            <a:r>
-              <a:rPr lang="pt-BR" dirty="0" smtClean="0">
-                <a:effectLst>
-                  <a:outerShdw blurRad="38100" dist="38100" dir="2700000" algn="tl">
-                    <a:srgbClr val="000000">
-                      <a:alpha val="43137"/>
-                    </a:srgbClr>
-                  </a:outerShdw>
-                </a:effectLst>
-              </a:rPr>
-              <a:t>Controle de Versão de Artefatos</a:t>
-            </a:r>
-            <a:endParaRPr lang="pt-BR" dirty="0">
-              <a:effectLst>
-                <a:outerShdw blurRad="38100" dist="38100" dir="2700000" algn="tl">
-                  <a:srgbClr val="000000">
-                    <a:alpha val="43137"/>
-                  </a:srgbClr>
-                </a:outerShdw>
-              </a:effectLst>
-            </a:endParaRPr>
-          </a:p>
-        </p:txBody>
-      </p:sp>
-      <p:sp>
-        <p:nvSpPr>
-          <p:cNvPr id="3" name="Espaço Reservado para Conteúdo 2"/>
-          <p:cNvSpPr>
-            <a:spLocks noGrp="1"/>
-          </p:cNvSpPr>
-          <p:nvPr>
-            <p:ph idx="1"/>
-          </p:nvPr>
-        </p:nvSpPr>
-        <p:spPr/>
-        <p:txBody>
-          <a:bodyPr/>
-          <a:lstStyle/>
-          <a:p>
-            <a:endParaRPr lang="pt-BR" sz="2000" dirty="0" smtClean="0"/>
-          </a:p>
-          <a:p>
-            <a:endParaRPr lang="pt-BR" sz="2000" dirty="0" smtClean="0"/>
-          </a:p>
-          <a:p>
-            <a:endParaRPr lang="pt-BR" sz="2000" dirty="0" smtClean="0"/>
-          </a:p>
-          <a:p>
-            <a:endParaRPr lang="pt-BR" sz="2000" dirty="0" smtClean="0"/>
-          </a:p>
-          <a:p>
-            <a:endParaRPr lang="pt-BR" sz="2000" dirty="0" smtClean="0"/>
-          </a:p>
-          <a:p>
-            <a:endParaRPr lang="pt-BR" sz="2000" dirty="0" smtClean="0"/>
-          </a:p>
-          <a:p>
-            <a:endParaRPr lang="pt-BR" sz="2000" dirty="0" smtClean="0"/>
-          </a:p>
-          <a:p>
-            <a:endParaRPr lang="pt-BR" sz="2000" dirty="0" smtClean="0"/>
-          </a:p>
-        </p:txBody>
-      </p:sp>
-      <p:sp>
-        <p:nvSpPr>
-          <p:cNvPr id="5" name="Fluxograma: Disco magnético 4"/>
-          <p:cNvSpPr/>
-          <p:nvPr/>
-        </p:nvSpPr>
-        <p:spPr>
-          <a:xfrm>
-            <a:off x="6372200" y="2996952"/>
-            <a:ext cx="1800200" cy="1440160"/>
-          </a:xfrm>
-          <a:prstGeom prst="flowChartMagneticDisk">
-            <a:avLst/>
-          </a:prstGeom>
-          <a:noFill/>
-        </p:spPr>
-        <p:style>
-          <a:lnRef idx="2">
-            <a:schemeClr val="accent1">
-              <a:shade val="50000"/>
-            </a:schemeClr>
-          </a:lnRef>
-          <a:fillRef idx="1">
-            <a:schemeClr val="accent1"/>
-          </a:fillRef>
-          <a:effectRef idx="0">
-            <a:schemeClr val="accent1"/>
-          </a:effectRef>
-          <a:fontRef idx="minor">
-            <a:schemeClr val="lt1"/>
-          </a:fontRef>
-        </p:style>
-        <p:txBody>
-          <a:bodyPr rtlCol="0" anchor="ctr"/>
-          <a:lstStyle/>
-          <a:p>
-            <a:pPr algn="ctr"/>
-            <a:r>
-              <a:rPr lang="pt-BR" dirty="0" smtClean="0">
-                <a:solidFill>
-                  <a:schemeClr val="tx1"/>
-                </a:solidFill>
-              </a:rPr>
-              <a:t>Repositório de Artefatos (Servidor)</a:t>
-            </a:r>
-            <a:endParaRPr lang="pt-BR" dirty="0">
-              <a:solidFill>
-                <a:schemeClr val="tx1"/>
-              </a:solidFill>
-            </a:endParaRPr>
-          </a:p>
-        </p:txBody>
-      </p:sp>
-      <p:pic>
-        <p:nvPicPr>
-          <p:cNvPr id="1026" name="Picture 2" descr="C:\Users\bfranca.LENS-ESE\AppData\Local\Microsoft\Windows\Temporary Internet Files\Content.IE5\62KHBMWX\MC900433944[1].png"/>
-          <p:cNvPicPr>
-            <a:picLocks noChangeAspect="1" noChangeArrowheads="1"/>
-          </p:cNvPicPr>
-          <p:nvPr/>
-        </p:nvPicPr>
-        <p:blipFill>
-          <a:blip r:embed="rId2" cstate="print"/>
-          <a:srcRect/>
-          <a:stretch>
-            <a:fillRect/>
-          </a:stretch>
-        </p:blipFill>
-        <p:spPr bwMode="auto">
-          <a:xfrm>
-            <a:off x="1115616" y="4653136"/>
-            <a:ext cx="1080120" cy="1080120"/>
-          </a:xfrm>
-          <a:prstGeom prst="rect">
-            <a:avLst/>
-          </a:prstGeom>
-          <a:noFill/>
-        </p:spPr>
-      </p:pic>
-      <p:pic>
-        <p:nvPicPr>
-          <p:cNvPr id="1027" name="Picture 3" descr="C:\Users\bfranca.LENS-ESE\AppData\Local\Microsoft\Windows\Temporary Internet Files\Content.IE5\TGO0ZPJZ\MC900433942[1].png"/>
-          <p:cNvPicPr>
-            <a:picLocks noChangeAspect="1" noChangeArrowheads="1"/>
-          </p:cNvPicPr>
-          <p:nvPr/>
-        </p:nvPicPr>
-        <p:blipFill>
-          <a:blip r:embed="rId3" cstate="print"/>
-          <a:srcRect/>
-          <a:stretch>
-            <a:fillRect/>
-          </a:stretch>
-        </p:blipFill>
-        <p:spPr bwMode="auto">
-          <a:xfrm>
-            <a:off x="611560" y="2996952"/>
-            <a:ext cx="1152128" cy="1152128"/>
-          </a:xfrm>
-          <a:prstGeom prst="rect">
-            <a:avLst/>
-          </a:prstGeom>
-          <a:noFill/>
-        </p:spPr>
-      </p:pic>
-      <p:pic>
-        <p:nvPicPr>
-          <p:cNvPr id="1028" name="Picture 4" descr="C:\Users\bfranca.LENS-ESE\AppData\Local\Microsoft\Windows\Temporary Internet Files\Content.IE5\OW7UR996\MC900433943[1].png"/>
-          <p:cNvPicPr>
-            <a:picLocks noChangeAspect="1" noChangeArrowheads="1"/>
-          </p:cNvPicPr>
-          <p:nvPr/>
-        </p:nvPicPr>
-        <p:blipFill>
-          <a:blip r:embed="rId4" cstate="print"/>
-          <a:srcRect/>
-          <a:stretch>
-            <a:fillRect/>
-          </a:stretch>
-        </p:blipFill>
-        <p:spPr bwMode="auto">
-          <a:xfrm>
-            <a:off x="1043608" y="1628800"/>
-            <a:ext cx="850404" cy="850404"/>
-          </a:xfrm>
-          <a:prstGeom prst="rect">
-            <a:avLst/>
-          </a:prstGeom>
-          <a:noFill/>
-        </p:spPr>
-      </p:pic>
-      <p:sp>
-        <p:nvSpPr>
-          <p:cNvPr id="11" name="Fluxograma: Disco magnético 10"/>
-          <p:cNvSpPr/>
-          <p:nvPr/>
-        </p:nvSpPr>
-        <p:spPr>
-          <a:xfrm>
-            <a:off x="2339752" y="4797152"/>
-            <a:ext cx="1080120" cy="720080"/>
-          </a:xfrm>
-          <a:prstGeom prst="flowChartMagneticDisk">
-            <a:avLst/>
-          </a:prstGeom>
-          <a:noFill/>
-        </p:spPr>
-        <p:style>
-          <a:lnRef idx="2">
-            <a:schemeClr val="accent1">
-              <a:shade val="50000"/>
-            </a:schemeClr>
-          </a:lnRef>
-          <a:fillRef idx="1">
-            <a:schemeClr val="accent1"/>
-          </a:fillRef>
-          <a:effectRef idx="0">
-            <a:schemeClr val="accent1"/>
-          </a:effectRef>
-          <a:fontRef idx="minor">
-            <a:schemeClr val="lt1"/>
-          </a:fontRef>
-        </p:style>
-        <p:txBody>
-          <a:bodyPr rtlCol="0" anchor="ctr"/>
-          <a:lstStyle/>
-          <a:p>
-            <a:pPr algn="ctr"/>
-            <a:r>
-              <a:rPr lang="pt-BR" sz="1400" dirty="0" err="1" smtClean="0">
-                <a:solidFill>
-                  <a:schemeClr val="tx1"/>
-                </a:solidFill>
-              </a:rPr>
-              <a:t>Workspace</a:t>
-            </a:r>
-            <a:r>
-              <a:rPr lang="pt-BR" sz="1400" dirty="0" smtClean="0">
-                <a:solidFill>
-                  <a:schemeClr val="tx1"/>
-                </a:solidFill>
-              </a:rPr>
-              <a:t> (Local)</a:t>
-            </a:r>
-            <a:endParaRPr lang="pt-BR" sz="1400" dirty="0">
-              <a:solidFill>
-                <a:schemeClr val="tx1"/>
-              </a:solidFill>
-            </a:endParaRPr>
-          </a:p>
-        </p:txBody>
-      </p:sp>
-      <p:sp>
-        <p:nvSpPr>
-          <p:cNvPr id="13" name="Fluxograma: Disco magnético 12"/>
-          <p:cNvSpPr/>
-          <p:nvPr/>
-        </p:nvSpPr>
-        <p:spPr>
-          <a:xfrm>
-            <a:off x="1763688" y="3212976"/>
-            <a:ext cx="1080120" cy="720080"/>
-          </a:xfrm>
-          <a:prstGeom prst="flowChartMagneticDisk">
-            <a:avLst/>
-          </a:prstGeom>
-          <a:noFill/>
-        </p:spPr>
-        <p:style>
-          <a:lnRef idx="2">
-            <a:schemeClr val="accent1">
-              <a:shade val="50000"/>
-            </a:schemeClr>
-          </a:lnRef>
-          <a:fillRef idx="1">
-            <a:schemeClr val="accent1"/>
-          </a:fillRef>
-          <a:effectRef idx="0">
-            <a:schemeClr val="accent1"/>
-          </a:effectRef>
-          <a:fontRef idx="minor">
-            <a:schemeClr val="lt1"/>
-          </a:fontRef>
-        </p:style>
-        <p:txBody>
-          <a:bodyPr rtlCol="0" anchor="ctr"/>
-          <a:lstStyle/>
-          <a:p>
-            <a:pPr algn="ctr"/>
-            <a:r>
-              <a:rPr lang="pt-BR" sz="1400" dirty="0" err="1" smtClean="0">
-                <a:solidFill>
-                  <a:schemeClr val="tx1"/>
-                </a:solidFill>
-              </a:rPr>
-              <a:t>Workspace</a:t>
-            </a:r>
-            <a:r>
-              <a:rPr lang="pt-BR" sz="1400" dirty="0" smtClean="0">
-                <a:solidFill>
-                  <a:schemeClr val="tx1"/>
-                </a:solidFill>
-              </a:rPr>
-              <a:t> (Local)</a:t>
-            </a:r>
-            <a:endParaRPr lang="pt-BR" sz="1400" dirty="0">
-              <a:solidFill>
-                <a:schemeClr val="tx1"/>
-              </a:solidFill>
-            </a:endParaRPr>
-          </a:p>
-        </p:txBody>
-      </p:sp>
-      <p:sp>
-        <p:nvSpPr>
-          <p:cNvPr id="14" name="Fluxograma: Disco magnético 13"/>
-          <p:cNvSpPr/>
-          <p:nvPr/>
-        </p:nvSpPr>
-        <p:spPr>
-          <a:xfrm>
-            <a:off x="2051720" y="1772816"/>
-            <a:ext cx="1080120" cy="720080"/>
-          </a:xfrm>
-          <a:prstGeom prst="flowChartMagneticDisk">
-            <a:avLst/>
-          </a:prstGeom>
-          <a:noFill/>
-        </p:spPr>
-        <p:style>
-          <a:lnRef idx="2">
-            <a:schemeClr val="accent1">
-              <a:shade val="50000"/>
-            </a:schemeClr>
-          </a:lnRef>
-          <a:fillRef idx="1">
-            <a:schemeClr val="accent1"/>
-          </a:fillRef>
-          <a:effectRef idx="0">
-            <a:schemeClr val="accent1"/>
-          </a:effectRef>
-          <a:fontRef idx="minor">
-            <a:schemeClr val="lt1"/>
-          </a:fontRef>
-        </p:style>
-        <p:txBody>
-          <a:bodyPr rtlCol="0" anchor="ctr"/>
-          <a:lstStyle/>
-          <a:p>
-            <a:pPr algn="ctr"/>
-            <a:r>
-              <a:rPr lang="pt-BR" sz="1400" dirty="0" err="1" smtClean="0">
-                <a:solidFill>
-                  <a:schemeClr val="tx1"/>
-                </a:solidFill>
-              </a:rPr>
-              <a:t>Workspace</a:t>
-            </a:r>
-            <a:r>
-              <a:rPr lang="pt-BR" sz="1400" dirty="0" smtClean="0">
-                <a:solidFill>
-                  <a:schemeClr val="tx1"/>
-                </a:solidFill>
-              </a:rPr>
-              <a:t> (Local)</a:t>
-            </a:r>
-            <a:endParaRPr lang="pt-BR" sz="1400" dirty="0">
-              <a:solidFill>
-                <a:schemeClr val="tx1"/>
-              </a:solidFill>
-            </a:endParaRPr>
-          </a:p>
-        </p:txBody>
-      </p:sp>
-      <p:cxnSp>
-        <p:nvCxnSpPr>
-          <p:cNvPr id="16" name="Conector de seta reta 15"/>
-          <p:cNvCxnSpPr>
-            <a:stCxn id="14" idx="4"/>
-          </p:cNvCxnSpPr>
-          <p:nvPr/>
-        </p:nvCxnSpPr>
-        <p:spPr>
-          <a:xfrm>
-            <a:off x="3131840" y="2132856"/>
-            <a:ext cx="3240360" cy="1296144"/>
-          </a:xfrm>
-          <a:prstGeom prst="straightConnector1">
-            <a:avLst/>
-          </a:prstGeom>
-          <a:ln w="28575">
-            <a:prstDash val="sysDash"/>
-            <a:tailEnd type="arrow"/>
-          </a:ln>
-        </p:spPr>
-        <p:style>
-          <a:lnRef idx="1">
-            <a:schemeClr val="accent1"/>
-          </a:lnRef>
-          <a:fillRef idx="0">
-            <a:schemeClr val="accent1"/>
-          </a:fillRef>
-          <a:effectRef idx="0">
-            <a:schemeClr val="accent1"/>
-          </a:effectRef>
-          <a:fontRef idx="minor">
-            <a:schemeClr val="tx1"/>
-          </a:fontRef>
-        </p:style>
-      </p:cxnSp>
-      <p:sp>
-        <p:nvSpPr>
-          <p:cNvPr id="17" name="CaixaDeTexto 16"/>
-          <p:cNvSpPr txBox="1"/>
-          <p:nvPr/>
-        </p:nvSpPr>
-        <p:spPr>
-          <a:xfrm>
-            <a:off x="4355976" y="2276872"/>
-            <a:ext cx="1568058" cy="307777"/>
-          </a:xfrm>
-          <a:prstGeom prst="rect">
-            <a:avLst/>
-          </a:prstGeom>
-          <a:noFill/>
-        </p:spPr>
-        <p:txBody>
-          <a:bodyPr wrap="none" rtlCol="0">
-            <a:spAutoFit/>
-          </a:bodyPr>
-          <a:lstStyle/>
-          <a:p>
-            <a:r>
-              <a:rPr lang="pt-BR" sz="1400" b="1" dirty="0" smtClean="0"/>
-              <a:t>ADD (Adicionar)</a:t>
-            </a:r>
-            <a:endParaRPr lang="pt-BR" sz="1400" b="1" dirty="0"/>
-          </a:p>
-        </p:txBody>
-      </p:sp>
-      <p:cxnSp>
-        <p:nvCxnSpPr>
-          <p:cNvPr id="18" name="Conector de seta reta 17"/>
-          <p:cNvCxnSpPr>
-            <a:stCxn id="13" idx="4"/>
-            <a:endCxn id="5" idx="2"/>
-          </p:cNvCxnSpPr>
-          <p:nvPr/>
-        </p:nvCxnSpPr>
-        <p:spPr>
-          <a:xfrm>
-            <a:off x="2843808" y="3573016"/>
-            <a:ext cx="3528392" cy="144016"/>
-          </a:xfrm>
-          <a:prstGeom prst="straightConnector1">
-            <a:avLst/>
-          </a:prstGeom>
-          <a:ln w="28575">
-            <a:prstDash val="sysDash"/>
-            <a:tailEnd type="arrow"/>
-          </a:ln>
-        </p:spPr>
-        <p:style>
-          <a:lnRef idx="1">
-            <a:schemeClr val="accent1"/>
-          </a:lnRef>
-          <a:fillRef idx="0">
-            <a:schemeClr val="accent1"/>
-          </a:fillRef>
-          <a:effectRef idx="0">
-            <a:schemeClr val="accent1"/>
-          </a:effectRef>
-          <a:fontRef idx="minor">
-            <a:schemeClr val="tx1"/>
-          </a:fontRef>
-        </p:style>
-      </p:cxnSp>
-      <p:sp>
-        <p:nvSpPr>
-          <p:cNvPr id="21" name="CaixaDeTexto 20"/>
-          <p:cNvSpPr txBox="1"/>
-          <p:nvPr/>
-        </p:nvSpPr>
-        <p:spPr>
-          <a:xfrm>
-            <a:off x="3779912" y="3284984"/>
-            <a:ext cx="1848583" cy="307777"/>
-          </a:xfrm>
-          <a:prstGeom prst="rect">
-            <a:avLst/>
-          </a:prstGeom>
-          <a:noFill/>
-        </p:spPr>
-        <p:txBody>
-          <a:bodyPr wrap="none" rtlCol="0">
-            <a:spAutoFit/>
-          </a:bodyPr>
-          <a:lstStyle/>
-          <a:p>
-            <a:r>
-              <a:rPr lang="pt-BR" sz="1400" b="1" dirty="0" err="1" smtClean="0"/>
-              <a:t>Commit</a:t>
-            </a:r>
-            <a:r>
-              <a:rPr lang="pt-BR" sz="1400" b="1" dirty="0" smtClean="0"/>
-              <a:t> (Submeter)</a:t>
-            </a:r>
-            <a:endParaRPr lang="pt-BR" sz="1400" b="1" dirty="0"/>
-          </a:p>
-        </p:txBody>
-      </p:sp>
-      <p:cxnSp>
-        <p:nvCxnSpPr>
-          <p:cNvPr id="22" name="Conector de seta reta 21"/>
-          <p:cNvCxnSpPr/>
-          <p:nvPr/>
-        </p:nvCxnSpPr>
-        <p:spPr>
-          <a:xfrm rot="10800000" flipV="1">
-            <a:off x="3419872" y="4077072"/>
-            <a:ext cx="2952328" cy="1080120"/>
-          </a:xfrm>
-          <a:prstGeom prst="straightConnector1">
-            <a:avLst/>
-          </a:prstGeom>
-          <a:ln w="28575">
-            <a:prstDash val="sysDash"/>
-            <a:tailEnd type="arrow"/>
-          </a:ln>
-        </p:spPr>
-        <p:style>
-          <a:lnRef idx="1">
-            <a:schemeClr val="accent1"/>
-          </a:lnRef>
-          <a:fillRef idx="0">
-            <a:schemeClr val="accent1"/>
-          </a:fillRef>
-          <a:effectRef idx="0">
-            <a:schemeClr val="accent1"/>
-          </a:effectRef>
-          <a:fontRef idx="minor">
-            <a:schemeClr val="tx1"/>
-          </a:fontRef>
-        </p:style>
-      </p:cxnSp>
-      <p:sp>
-        <p:nvSpPr>
-          <p:cNvPr id="25" name="CaixaDeTexto 24"/>
-          <p:cNvSpPr txBox="1"/>
-          <p:nvPr/>
-        </p:nvSpPr>
-        <p:spPr>
-          <a:xfrm>
-            <a:off x="3635896" y="4221088"/>
-            <a:ext cx="1845377" cy="307777"/>
-          </a:xfrm>
-          <a:prstGeom prst="rect">
-            <a:avLst/>
-          </a:prstGeom>
-          <a:noFill/>
-        </p:spPr>
-        <p:txBody>
-          <a:bodyPr wrap="none" rtlCol="0">
-            <a:spAutoFit/>
-          </a:bodyPr>
-          <a:lstStyle/>
-          <a:p>
-            <a:r>
-              <a:rPr lang="pt-BR" sz="1400" b="1" dirty="0" err="1" smtClean="0"/>
-              <a:t>Update</a:t>
-            </a:r>
-            <a:r>
-              <a:rPr lang="pt-BR" sz="1400" b="1" dirty="0" smtClean="0"/>
-              <a:t> (Recuperar)</a:t>
-            </a:r>
-            <a:endParaRPr lang="pt-BR" sz="1400" b="1" dirty="0"/>
-          </a:p>
-        </p:txBody>
-      </p:sp>
-    </p:spTree>
-  </p:cSld>
-  <p:clrMapOvr>
-    <a:masterClrMapping/>
-  </p:clrMapOvr>
-  <p:timing>
-    <p:tnLst>
-      <p:par>
-        <p:cTn id="1" dur="indefinite" restart="never" nodeType="tmRoot"/>
-      </p:par>
-    </p:tnLst>
-  </p:timing>
-</p:sld>
-</file>
-
-<file path=ppt/slides/slide20.xml><?xml version="1.0" encoding="utf-8"?>
+<file path=ppt/slides/slide22.xml><?xml version="1.0" encoding="utf-8"?>
 <p:sld xmlns:a="http://schemas.openxmlformats.org/drawingml/2006/main" xmlns:r="http://schemas.openxmlformats.org/officeDocument/2006/relationships" xmlns:p="http://schemas.openxmlformats.org/presentationml/2006/main">
   <p:cSld>
     <p:spTree>
@@ -20509,7 +21304,7 @@
 </p:sld>
 </file>
 
-<file path=ppt/slides/slide21.xml><?xml version="1.0" encoding="utf-8"?>
+<file path=ppt/slides/slide23.xml><?xml version="1.0" encoding="utf-8"?>
 <p:sld xmlns:a="http://schemas.openxmlformats.org/drawingml/2006/main" xmlns:r="http://schemas.openxmlformats.org/officeDocument/2006/relationships" xmlns:p="http://schemas.openxmlformats.org/presentationml/2006/main">
   <p:cSld>
     <p:spTree>
@@ -20720,7 +21515,7 @@
 </p:sld>
 </file>
 
-<file path=ppt/slides/slide22.xml><?xml version="1.0" encoding="utf-8"?>
+<file path=ppt/slides/slide24.xml><?xml version="1.0" encoding="utf-8"?>
 <p:sld xmlns:a="http://schemas.openxmlformats.org/drawingml/2006/main" xmlns:r="http://schemas.openxmlformats.org/officeDocument/2006/relationships" xmlns:p="http://schemas.openxmlformats.org/presentationml/2006/main">
   <p:cSld>
     <p:spTree>
@@ -21146,7 +21941,7 @@
 </p:sld>
 </file>
 
-<file path=ppt/slides/slide23.xml><?xml version="1.0" encoding="utf-8"?>
+<file path=ppt/slides/slide25.xml><?xml version="1.0" encoding="utf-8"?>
 <p:sld xmlns:a="http://schemas.openxmlformats.org/drawingml/2006/main" xmlns:r="http://schemas.openxmlformats.org/officeDocument/2006/relationships" xmlns:p="http://schemas.openxmlformats.org/presentationml/2006/main">
   <p:cSld>
     <p:spTree>
@@ -21484,7 +22279,7 @@
 </p:sld>
 </file>
 
-<file path=ppt/slides/slide24.xml><?xml version="1.0" encoding="utf-8"?>
+<file path=ppt/slides/slide26.xml><?xml version="1.0" encoding="utf-8"?>
 <p:sld xmlns:a="http://schemas.openxmlformats.org/drawingml/2006/main" xmlns:r="http://schemas.openxmlformats.org/officeDocument/2006/relationships" xmlns:p="http://schemas.openxmlformats.org/presentationml/2006/main">
   <p:cSld>
     <p:spTree>
@@ -21709,7 +22504,7 @@
 </p:sld>
 </file>
 
-<file path=ppt/slides/slide25.xml><?xml version="1.0" encoding="utf-8"?>
+<file path=ppt/slides/slide27.xml><?xml version="1.0" encoding="utf-8"?>
 <p:sld xmlns:a="http://schemas.openxmlformats.org/drawingml/2006/main" xmlns:r="http://schemas.openxmlformats.org/officeDocument/2006/relationships" xmlns:p="http://schemas.openxmlformats.org/presentationml/2006/main">
   <p:cSld>
     <p:spTree>
@@ -22105,7 +22900,7 @@
 </p:sld>
 </file>
 
-<file path=ppt/slides/slide26.xml><?xml version="1.0" encoding="utf-8"?>
+<file path=ppt/slides/slide28.xml><?xml version="1.0" encoding="utf-8"?>
 <p:sld xmlns:a="http://schemas.openxmlformats.org/drawingml/2006/main" xmlns:r="http://schemas.openxmlformats.org/officeDocument/2006/relationships" xmlns:p="http://schemas.openxmlformats.org/presentationml/2006/main">
   <p:cSld>
     <p:spTree>
@@ -22471,7 +23266,7 @@
 </p:sld>
 </file>
 
-<file path=ppt/slides/slide27.xml><?xml version="1.0" encoding="utf-8"?>
+<file path=ppt/slides/slide29.xml><?xml version="1.0" encoding="utf-8"?>
 <p:sld xmlns:a="http://schemas.openxmlformats.org/drawingml/2006/main" xmlns:r="http://schemas.openxmlformats.org/officeDocument/2006/relationships" xmlns:p="http://schemas.openxmlformats.org/presentationml/2006/main">
   <p:cSld>
     <p:spTree>

</xml_diff>